<commit_message>
Fix slide and added .gitignore
</commit_message>
<xml_diff>
--- a/lectures/09-09-CUDA-Introduction-1-of-2.pptx
+++ b/lectures/09-09-CUDA-Introduction-1-of-2.pptx
@@ -571,7 +571,7 @@
             <a:tailEnd/>
           </a:ln>
           <a:extLst>
-            <a:ext uri="{909E8E84-426E-40DD-AFC4-6F175D3DCCD1}">
+            <a:ext uri="{909E8E84-426E-40dd-AFC4-6F175D3DCCD1}">
               <a14:hiddenFill xmlns:a14="http://schemas.microsoft.com/office/drawing/2010/main">
                 <a:solidFill>
                   <a:srgbClr val="FFFFFF"/>
@@ -930,19 +930,11 @@
           <a:p>
             <a:r>
               <a:rPr lang="en-US" dirty="0" smtClean="0"/>
-              <a:t>More recent – </a:t>
-            </a:r>
-            <a:r>
-              <a:rPr lang="en-US" dirty="0" smtClean="0"/>
-              <a:t>WebCL</a:t>
+              <a:t>More recent – WebCL</a:t>
             </a:r>
             <a:r>
               <a:rPr lang="en-US" baseline="0" dirty="0" smtClean="0"/>
-              <a:t>.  </a:t>
-            </a:r>
-            <a:r>
-              <a:rPr lang="en-US" baseline="0" dirty="0" smtClean="0"/>
-              <a:t>Compute shaders have been in Direct3D for a while.</a:t>
+              <a:t>.  Compute shaders have been in Direct3D for a while.</a:t>
             </a:r>
             <a:endParaRPr lang="en-US" dirty="0"/>
           </a:p>
@@ -1021,14 +1013,14 @@
           <a:noFill/>
           <a:ln/>
           <a:extLst>
-            <a:ext uri="{909E8E84-426E-40DD-AFC4-6F175D3DCCD1}">
+            <a:ext uri="{909E8E84-426E-40dd-AFC4-6F175D3DCCD1}">
               <a14:hiddenFill xmlns:a14="http://schemas.microsoft.com/office/drawing/2010/main">
                 <a:solidFill>
                   <a:srgbClr val="FFFFFF"/>
                 </a:solidFill>
               </a14:hiddenFill>
             </a:ext>
-            <a:ext uri="{91240B29-F687-4F45-9708-019B960494DF}">
+            <a:ext uri="{91240B29-F687-4f45-9708-019B960494DF}">
               <a14:hiddenLine xmlns:a14="http://schemas.microsoft.com/office/drawing/2010/main" w="9525">
                 <a:solidFill>
                   <a:srgbClr val="000000"/>
@@ -1178,14 +1170,14 @@
           <a:noFill/>
           <a:ln/>
           <a:extLst>
-            <a:ext uri="{909E8E84-426E-40DD-AFC4-6F175D3DCCD1}">
+            <a:ext uri="{909E8E84-426E-40dd-AFC4-6F175D3DCCD1}">
               <a14:hiddenFill xmlns:a14="http://schemas.microsoft.com/office/drawing/2010/main">
                 <a:solidFill>
                   <a:srgbClr val="FFFFFF"/>
                 </a:solidFill>
               </a14:hiddenFill>
             </a:ext>
-            <a:ext uri="{91240B29-F687-4F45-9708-019B960494DF}">
+            <a:ext uri="{91240B29-F687-4f45-9708-019B960494DF}">
               <a14:hiddenLine xmlns:a14="http://schemas.microsoft.com/office/drawing/2010/main" w="9525">
                 <a:solidFill>
                   <a:srgbClr val="000000"/>
@@ -1247,14 +1239,14 @@
           <a:noFill/>
           <a:ln/>
           <a:extLst>
-            <a:ext uri="{909E8E84-426E-40DD-AFC4-6F175D3DCCD1}">
+            <a:ext uri="{909E8E84-426E-40dd-AFC4-6F175D3DCCD1}">
               <a14:hiddenFill xmlns:a14="http://schemas.microsoft.com/office/drawing/2010/main">
                 <a:solidFill>
                   <a:srgbClr val="FFFFFF"/>
                 </a:solidFill>
               </a14:hiddenFill>
             </a:ext>
-            <a:ext uri="{91240B29-F687-4F45-9708-019B960494DF}">
+            <a:ext uri="{91240B29-F687-4f45-9708-019B960494DF}">
               <a14:hiddenLine xmlns:a14="http://schemas.microsoft.com/office/drawing/2010/main" w="9525">
                 <a:solidFill>
                   <a:srgbClr val="000000"/>
@@ -1404,14 +1396,14 @@
           <a:noFill/>
           <a:ln/>
           <a:extLst>
-            <a:ext uri="{909E8E84-426E-40DD-AFC4-6F175D3DCCD1}">
+            <a:ext uri="{909E8E84-426E-40dd-AFC4-6F175D3DCCD1}">
               <a14:hiddenFill xmlns:a14="http://schemas.microsoft.com/office/drawing/2010/main">
                 <a:solidFill>
                   <a:srgbClr val="FFFFFF"/>
                 </a:solidFill>
               </a14:hiddenFill>
             </a:ext>
-            <a:ext uri="{91240B29-F687-4F45-9708-019B960494DF}">
+            <a:ext uri="{91240B29-F687-4f45-9708-019B960494DF}">
               <a14:hiddenLine xmlns:a14="http://schemas.microsoft.com/office/drawing/2010/main" w="9525">
                 <a:solidFill>
                   <a:srgbClr val="000000"/>
@@ -1470,14 +1462,14 @@
           <a:noFill/>
           <a:ln/>
           <a:extLst>
-            <a:ext uri="{909E8E84-426E-40DD-AFC4-6F175D3DCCD1}">
+            <a:ext uri="{909E8E84-426E-40dd-AFC4-6F175D3DCCD1}">
               <a14:hiddenFill xmlns:a14="http://schemas.microsoft.com/office/drawing/2010/main">
                 <a:solidFill>
                   <a:srgbClr val="FFFFFF"/>
                 </a:solidFill>
               </a14:hiddenFill>
             </a:ext>
-            <a:ext uri="{91240B29-F687-4F45-9708-019B960494DF}">
+            <a:ext uri="{91240B29-F687-4f45-9708-019B960494DF}">
               <a14:hiddenLine xmlns:a14="http://schemas.microsoft.com/office/drawing/2010/main" w="9525">
                 <a:solidFill>
                   <a:srgbClr val="000000"/>
@@ -1627,14 +1619,14 @@
           <a:noFill/>
           <a:ln/>
           <a:extLst>
-            <a:ext uri="{909E8E84-426E-40DD-AFC4-6F175D3DCCD1}">
+            <a:ext uri="{909E8E84-426E-40dd-AFC4-6F175D3DCCD1}">
               <a14:hiddenFill xmlns:a14="http://schemas.microsoft.com/office/drawing/2010/main">
                 <a:solidFill>
                   <a:srgbClr val="FFFFFF"/>
                 </a:solidFill>
               </a14:hiddenFill>
             </a:ext>
-            <a:ext uri="{91240B29-F687-4F45-9708-019B960494DF}">
+            <a:ext uri="{91240B29-F687-4f45-9708-019B960494DF}">
               <a14:hiddenLine xmlns:a14="http://schemas.microsoft.com/office/drawing/2010/main" w="9525">
                 <a:solidFill>
                   <a:srgbClr val="000000"/>
@@ -1693,14 +1685,14 @@
           <a:noFill/>
           <a:ln/>
           <a:extLst>
-            <a:ext uri="{909E8E84-426E-40DD-AFC4-6F175D3DCCD1}">
+            <a:ext uri="{909E8E84-426E-40dd-AFC4-6F175D3DCCD1}">
               <a14:hiddenFill xmlns:a14="http://schemas.microsoft.com/office/drawing/2010/main">
                 <a:solidFill>
                   <a:srgbClr val="FFFFFF"/>
                 </a:solidFill>
               </a14:hiddenFill>
             </a:ext>
-            <a:ext uri="{91240B29-F687-4F45-9708-019B960494DF}">
+            <a:ext uri="{91240B29-F687-4f45-9708-019B960494DF}">
               <a14:hiddenLine xmlns:a14="http://schemas.microsoft.com/office/drawing/2010/main" w="9525">
                 <a:solidFill>
                   <a:srgbClr val="000000"/>
@@ -1850,14 +1842,14 @@
           <a:noFill/>
           <a:ln/>
           <a:extLst>
-            <a:ext uri="{909E8E84-426E-40DD-AFC4-6F175D3DCCD1}">
+            <a:ext uri="{909E8E84-426E-40dd-AFC4-6F175D3DCCD1}">
               <a14:hiddenFill xmlns:a14="http://schemas.microsoft.com/office/drawing/2010/main">
                 <a:solidFill>
                   <a:srgbClr val="FFFFFF"/>
                 </a:solidFill>
               </a14:hiddenFill>
             </a:ext>
-            <a:ext uri="{91240B29-F687-4F45-9708-019B960494DF}">
+            <a:ext uri="{91240B29-F687-4f45-9708-019B960494DF}">
               <a14:hiddenLine xmlns:a14="http://schemas.microsoft.com/office/drawing/2010/main" w="9525">
                 <a:solidFill>
                   <a:srgbClr val="000000"/>
@@ -2153,7 +2145,7 @@
               <a:noFill/>
             </a:ln>
             <a:extLst>
-              <a:ext uri="{91240B29-F687-4F45-9708-019B960494DF}">
+              <a:ext uri="{91240B29-F687-4f45-9708-019B960494DF}">
                 <a14:hiddenLine xmlns:a14="http://schemas.microsoft.com/office/drawing/2010/main" w="9525">
                   <a:solidFill>
                     <a:srgbClr val="000000"/>
@@ -2199,7 +2191,7 @@
               <a:noFill/>
             </a:ln>
             <a:extLst>
-              <a:ext uri="{91240B29-F687-4F45-9708-019B960494DF}">
+              <a:ext uri="{91240B29-F687-4f45-9708-019B960494DF}">
                 <a14:hiddenLine xmlns:a14="http://schemas.microsoft.com/office/drawing/2010/main" w="9525">
                   <a:solidFill>
                     <a:srgbClr val="000000"/>
@@ -2261,7 +2253,7 @@
                 <a:noFill/>
               </a:ln>
               <a:extLst>
-                <a:ext uri="{91240B29-F687-4F45-9708-019B960494DF}">
+                <a:ext uri="{91240B29-F687-4f45-9708-019B960494DF}">
                   <a14:hiddenLine xmlns:a14="http://schemas.microsoft.com/office/drawing/2010/main" w="9525">
                     <a:solidFill>
                       <a:srgbClr val="000000"/>
@@ -2307,7 +2299,7 @@
                 <a:noFill/>
               </a:ln>
               <a:extLst>
-                <a:ext uri="{91240B29-F687-4F45-9708-019B960494DF}">
+                <a:ext uri="{91240B29-F687-4f45-9708-019B960494DF}">
                   <a14:hiddenLine xmlns:a14="http://schemas.microsoft.com/office/drawing/2010/main" w="9525">
                     <a:solidFill>
                       <a:srgbClr val="000000"/>
@@ -2353,7 +2345,7 @@
                 <a:noFill/>
               </a:ln>
               <a:extLst>
-                <a:ext uri="{91240B29-F687-4F45-9708-019B960494DF}">
+                <a:ext uri="{91240B29-F687-4f45-9708-019B960494DF}">
                   <a14:hiddenLine xmlns:a14="http://schemas.microsoft.com/office/drawing/2010/main" w="9525">
                     <a:solidFill>
                       <a:srgbClr val="000000"/>
@@ -2399,7 +2391,7 @@
                 <a:noFill/>
               </a:ln>
               <a:extLst>
-                <a:ext uri="{91240B29-F687-4F45-9708-019B960494DF}">
+                <a:ext uri="{91240B29-F687-4f45-9708-019B960494DF}">
                   <a14:hiddenLine xmlns:a14="http://schemas.microsoft.com/office/drawing/2010/main" w="9525">
                     <a:solidFill>
                       <a:srgbClr val="000000"/>
@@ -2445,7 +2437,7 @@
                 <a:noFill/>
               </a:ln>
               <a:extLst>
-                <a:ext uri="{91240B29-F687-4F45-9708-019B960494DF}">
+                <a:ext uri="{91240B29-F687-4f45-9708-019B960494DF}">
                   <a14:hiddenLine xmlns:a14="http://schemas.microsoft.com/office/drawing/2010/main" w="9525">
                     <a:solidFill>
                       <a:srgbClr val="000000"/>
@@ -2491,7 +2483,7 @@
                 <a:noFill/>
               </a:ln>
               <a:extLst>
-                <a:ext uri="{91240B29-F687-4F45-9708-019B960494DF}">
+                <a:ext uri="{91240B29-F687-4f45-9708-019B960494DF}">
                   <a14:hiddenLine xmlns:a14="http://schemas.microsoft.com/office/drawing/2010/main" w="9525">
                     <a:solidFill>
                       <a:srgbClr val="000000"/>
@@ -2537,7 +2529,7 @@
                 <a:noFill/>
               </a:ln>
               <a:extLst>
-                <a:ext uri="{91240B29-F687-4F45-9708-019B960494DF}">
+                <a:ext uri="{91240B29-F687-4f45-9708-019B960494DF}">
                   <a14:hiddenLine xmlns:a14="http://schemas.microsoft.com/office/drawing/2010/main" w="9525">
                     <a:solidFill>
                       <a:srgbClr val="000000"/>
@@ -2583,7 +2575,7 @@
                 <a:noFill/>
               </a:ln>
               <a:extLst>
-                <a:ext uri="{91240B29-F687-4F45-9708-019B960494DF}">
+                <a:ext uri="{91240B29-F687-4f45-9708-019B960494DF}">
                   <a14:hiddenLine xmlns:a14="http://schemas.microsoft.com/office/drawing/2010/main" w="9525">
                     <a:solidFill>
                       <a:srgbClr val="000000"/>
@@ -2629,7 +2621,7 @@
                 <a:noFill/>
               </a:ln>
               <a:extLst>
-                <a:ext uri="{91240B29-F687-4F45-9708-019B960494DF}">
+                <a:ext uri="{91240B29-F687-4f45-9708-019B960494DF}">
                   <a14:hiddenLine xmlns:a14="http://schemas.microsoft.com/office/drawing/2010/main" w="9525">
                     <a:solidFill>
                       <a:srgbClr val="000000"/>
@@ -2675,7 +2667,7 @@
                 <a:noFill/>
               </a:ln>
               <a:extLst>
-                <a:ext uri="{91240B29-F687-4F45-9708-019B960494DF}">
+                <a:ext uri="{91240B29-F687-4f45-9708-019B960494DF}">
                   <a14:hiddenLine xmlns:a14="http://schemas.microsoft.com/office/drawing/2010/main" w="9525">
                     <a:solidFill>
                       <a:srgbClr val="000000"/>
@@ -5475,7 +5467,7 @@
               <a:noFill/>
             </a:ln>
             <a:extLst>
-              <a:ext uri="{91240B29-F687-4F45-9708-019B960494DF}">
+              <a:ext uri="{91240B29-F687-4f45-9708-019B960494DF}">
                 <a14:hiddenLine xmlns:a14="http://schemas.microsoft.com/office/drawing/2010/main" w="9525">
                   <a:solidFill>
                     <a:srgbClr val="000000"/>
@@ -5529,7 +5521,7 @@
               <a:noFill/>
             </a:ln>
             <a:extLst>
-              <a:ext uri="{91240B29-F687-4F45-9708-019B960494DF}">
+              <a:ext uri="{91240B29-F687-4f45-9708-019B960494DF}">
                 <a14:hiddenLine xmlns:a14="http://schemas.microsoft.com/office/drawing/2010/main" w="9525">
                   <a:solidFill>
                     <a:srgbClr val="000000"/>
@@ -5575,7 +5567,7 @@
               <a:noFill/>
             </a:ln>
             <a:extLst>
-              <a:ext uri="{91240B29-F687-4F45-9708-019B960494DF}">
+              <a:ext uri="{91240B29-F687-4f45-9708-019B960494DF}">
                 <a14:hiddenLine xmlns:a14="http://schemas.microsoft.com/office/drawing/2010/main" w="9525">
                   <a:solidFill>
                     <a:srgbClr val="000000"/>
@@ -5623,7 +5615,7 @@
               <a:noFill/>
             </a:ln>
             <a:extLst>
-              <a:ext uri="{91240B29-F687-4F45-9708-019B960494DF}">
+              <a:ext uri="{91240B29-F687-4f45-9708-019B960494DF}">
                 <a14:hiddenLine xmlns:a14="http://schemas.microsoft.com/office/drawing/2010/main" w="9525">
                   <a:solidFill>
                     <a:srgbClr val="000000"/>
@@ -5671,7 +5663,7 @@
               <a:noFill/>
             </a:ln>
             <a:extLst>
-              <a:ext uri="{91240B29-F687-4F45-9708-019B960494DF}">
+              <a:ext uri="{91240B29-F687-4f45-9708-019B960494DF}">
                 <a14:hiddenLine xmlns:a14="http://schemas.microsoft.com/office/drawing/2010/main" w="9525">
                   <a:solidFill>
                     <a:srgbClr val="000000"/>
@@ -5719,7 +5711,7 @@
               <a:noFill/>
             </a:ln>
             <a:extLst>
-              <a:ext uri="{91240B29-F687-4F45-9708-019B960494DF}">
+              <a:ext uri="{91240B29-F687-4f45-9708-019B960494DF}">
                 <a14:hiddenLine xmlns:a14="http://schemas.microsoft.com/office/drawing/2010/main" w="9525">
                   <a:solidFill>
                     <a:srgbClr val="000000"/>
@@ -5767,7 +5759,7 @@
               <a:noFill/>
             </a:ln>
             <a:extLst>
-              <a:ext uri="{91240B29-F687-4F45-9708-019B960494DF}">
+              <a:ext uri="{91240B29-F687-4f45-9708-019B960494DF}">
                 <a14:hiddenLine xmlns:a14="http://schemas.microsoft.com/office/drawing/2010/main" w="9525">
                   <a:solidFill>
                     <a:srgbClr val="000000"/>
@@ -5813,7 +5805,7 @@
               <a:noFill/>
             </a:ln>
             <a:extLst>
-              <a:ext uri="{91240B29-F687-4F45-9708-019B960494DF}">
+              <a:ext uri="{91240B29-F687-4f45-9708-019B960494DF}">
                 <a14:hiddenLine xmlns:a14="http://schemas.microsoft.com/office/drawing/2010/main" w="9525">
                   <a:solidFill>
                     <a:srgbClr val="000000"/>
@@ -5861,7 +5853,7 @@
               <a:noFill/>
             </a:ln>
             <a:extLst>
-              <a:ext uri="{91240B29-F687-4F45-9708-019B960494DF}">
+              <a:ext uri="{91240B29-F687-4f45-9708-019B960494DF}">
                 <a14:hiddenLine xmlns:a14="http://schemas.microsoft.com/office/drawing/2010/main" w="9525">
                   <a:solidFill>
                     <a:srgbClr val="000000"/>
@@ -5910,14 +5902,14 @@
             <a:noFill/>
           </a:ln>
           <a:extLst>
-            <a:ext uri="{909E8E84-426E-40DD-AFC4-6F175D3DCCD1}">
+            <a:ext uri="{909E8E84-426E-40dd-AFC4-6F175D3DCCD1}">
               <a14:hiddenFill xmlns:a14="http://schemas.microsoft.com/office/drawing/2010/main">
                 <a:solidFill>
                   <a:srgbClr val="FFFFFF"/>
                 </a:solidFill>
               </a14:hiddenFill>
             </a:ext>
-            <a:ext uri="{91240B29-F687-4F45-9708-019B960494DF}">
+            <a:ext uri="{91240B29-F687-4f45-9708-019B960494DF}">
               <a14:hiddenLine xmlns:a14="http://schemas.microsoft.com/office/drawing/2010/main" w="9525">
                 <a:solidFill>
                   <a:srgbClr val="000000"/>
@@ -5968,14 +5960,14 @@
             <a:noFill/>
           </a:ln>
           <a:extLst>
-            <a:ext uri="{909E8E84-426E-40DD-AFC4-6F175D3DCCD1}">
+            <a:ext uri="{909E8E84-426E-40dd-AFC4-6F175D3DCCD1}">
               <a14:hiddenFill xmlns:a14="http://schemas.microsoft.com/office/drawing/2010/main">
                 <a:solidFill>
                   <a:srgbClr val="FFFFFF"/>
                 </a:solidFill>
               </a14:hiddenFill>
             </a:ext>
-            <a:ext uri="{91240B29-F687-4F45-9708-019B960494DF}">
+            <a:ext uri="{91240B29-F687-4f45-9708-019B960494DF}">
               <a14:hiddenLine xmlns:a14="http://schemas.microsoft.com/office/drawing/2010/main" w="9525">
                 <a:solidFill>
                   <a:srgbClr val="000000"/>
@@ -6623,7 +6615,7 @@
           </a:prstGeom>
           <a:noFill/>
           <a:extLst>
-            <a:ext uri="{909E8E84-426E-40DD-AFC4-6F175D3DCCD1}">
+            <a:ext uri="{909E8E84-426E-40dd-AFC4-6F175D3DCCD1}">
               <a14:hiddenFill xmlns:a14="http://schemas.microsoft.com/office/drawing/2010/main">
                 <a:solidFill>
                   <a:srgbClr val="FFFFFF"/>
@@ -6646,7 +6638,7 @@
   <p:timing>
     <p:tnLst>
       <p:par>
-        <p:cTn id="1" dur="indefinite" restart="never" nodeType="tmRoot"/>
+        <p:cTn xmlns:p14="http://schemas.microsoft.com/office/powerpoint/2010/main" id="1" dur="indefinite" restart="never" nodeType="tmRoot"/>
       </p:par>
     </p:tnLst>
   </p:timing>
@@ -6814,7 +6806,7 @@
   <p:timing>
     <p:tnLst>
       <p:par>
-        <p:cTn id="1" dur="indefinite" restart="never" nodeType="tmRoot"/>
+        <p:cTn xmlns:p14="http://schemas.microsoft.com/office/powerpoint/2010/main" id="1" dur="indefinite" restart="never" nodeType="tmRoot"/>
       </p:par>
     </p:tnLst>
   </p:timing>
@@ -6920,14 +6912,14 @@
             <a:noFill/>
           </a:ln>
           <a:extLst>
-            <a:ext uri="{909E8E84-426E-40DD-AFC4-6F175D3DCCD1}">
+            <a:ext uri="{909E8E84-426E-40dd-AFC4-6F175D3DCCD1}">
               <a14:hiddenFill xmlns:a14="http://schemas.microsoft.com/office/drawing/2010/main">
                 <a:solidFill>
                   <a:srgbClr val="FFFFFF"/>
                 </a:solidFill>
               </a14:hiddenFill>
             </a:ext>
-            <a:ext uri="{91240B29-F687-4F45-9708-019B960494DF}">
+            <a:ext uri="{91240B29-F687-4f45-9708-019B960494DF}">
               <a14:hiddenLine xmlns:a14="http://schemas.microsoft.com/office/drawing/2010/main" w="9525">
                 <a:solidFill>
                   <a:srgbClr val="000000"/>
@@ -6982,7 +6974,7 @@
               <a:tailEnd/>
             </a:ln>
             <a:extLst>
-              <a:ext uri="{909E8E84-426E-40DD-AFC4-6F175D3DCCD1}">
+              <a:ext uri="{909E8E84-426E-40dd-AFC4-6F175D3DCCD1}">
                 <a14:hiddenFill xmlns:a14="http://schemas.microsoft.com/office/drawing/2010/main">
                   <a:solidFill>
                     <a:srgbClr val="FFFFFF"/>
@@ -7131,7 +7123,7 @@
               <a:tailEnd/>
             </a:ln>
             <a:extLst>
-              <a:ext uri="{909E8E84-426E-40DD-AFC4-6F175D3DCCD1}">
+              <a:ext uri="{909E8E84-426E-40dd-AFC4-6F175D3DCCD1}">
                 <a14:hiddenFill xmlns:a14="http://schemas.microsoft.com/office/drawing/2010/main">
                   <a:solidFill>
                     <a:srgbClr val="FFFFFF"/>
@@ -7180,7 +7172,7 @@
               <a:tailEnd type="triangle" w="med" len="med"/>
             </a:ln>
             <a:extLst>
-              <a:ext uri="{909E8E84-426E-40DD-AFC4-6F175D3DCCD1}">
+              <a:ext uri="{909E8E84-426E-40dd-AFC4-6F175D3DCCD1}">
                 <a14:hiddenFill xmlns:a14="http://schemas.microsoft.com/office/drawing/2010/main">
                   <a:noFill/>
                 </a14:hiddenFill>
@@ -7231,7 +7223,7 @@
               <a:tailEnd/>
             </a:ln>
             <a:extLst>
-              <a:ext uri="{909E8E84-426E-40DD-AFC4-6F175D3DCCD1}">
+              <a:ext uri="{909E8E84-426E-40dd-AFC4-6F175D3DCCD1}">
                 <a14:hiddenFill xmlns:a14="http://schemas.microsoft.com/office/drawing/2010/main">
                   <a:solidFill>
                     <a:srgbClr val="FFFFFF"/>
@@ -7392,7 +7384,7 @@
               <a:tailEnd/>
             </a:ln>
             <a:extLst>
-              <a:ext uri="{909E8E84-426E-40DD-AFC4-6F175D3DCCD1}">
+              <a:ext uri="{909E8E84-426E-40dd-AFC4-6F175D3DCCD1}">
                 <a14:hiddenFill xmlns:a14="http://schemas.microsoft.com/office/drawing/2010/main">
                   <a:solidFill>
                     <a:srgbClr val="FFFFFF"/>
@@ -7441,7 +7433,7 @@
               <a:tailEnd type="triangle" w="med" len="med"/>
             </a:ln>
             <a:extLst>
-              <a:ext uri="{909E8E84-426E-40DD-AFC4-6F175D3DCCD1}">
+              <a:ext uri="{909E8E84-426E-40dd-AFC4-6F175D3DCCD1}">
                 <a14:hiddenFill xmlns:a14="http://schemas.microsoft.com/office/drawing/2010/main">
                   <a:noFill/>
                 </a14:hiddenFill>
@@ -7492,7 +7484,7 @@
               <a:tailEnd/>
             </a:ln>
             <a:extLst>
-              <a:ext uri="{909E8E84-426E-40DD-AFC4-6F175D3DCCD1}">
+              <a:ext uri="{909E8E84-426E-40dd-AFC4-6F175D3DCCD1}">
                 <a14:hiddenFill xmlns:a14="http://schemas.microsoft.com/office/drawing/2010/main">
                   <a:solidFill>
                     <a:srgbClr val="FFFFFF"/>
@@ -7653,7 +7645,7 @@
               <a:tailEnd/>
             </a:ln>
             <a:extLst>
-              <a:ext uri="{909E8E84-426E-40DD-AFC4-6F175D3DCCD1}">
+              <a:ext uri="{909E8E84-426E-40dd-AFC4-6F175D3DCCD1}">
                 <a14:hiddenFill xmlns:a14="http://schemas.microsoft.com/office/drawing/2010/main">
                   <a:solidFill>
                     <a:srgbClr val="FFFFFF"/>
@@ -7702,7 +7694,7 @@
               <a:tailEnd type="triangle" w="med" len="med"/>
             </a:ln>
             <a:extLst>
-              <a:ext uri="{909E8E84-426E-40DD-AFC4-6F175D3DCCD1}">
+              <a:ext uri="{909E8E84-426E-40dd-AFC4-6F175D3DCCD1}">
                 <a14:hiddenFill xmlns:a14="http://schemas.microsoft.com/office/drawing/2010/main">
                   <a:noFill/>
                 </a14:hiddenFill>
@@ -7719,7 +7711,7 @@
   <p:timing>
     <p:tnLst>
       <p:par>
-        <p:cTn id="1" dur="indefinite" restart="never" nodeType="tmRoot">
+        <p:cTn xmlns:p14="http://schemas.microsoft.com/office/powerpoint/2010/main" id="1" dur="indefinite" restart="never" nodeType="tmRoot">
           <p:childTnLst>
             <p:seq concurrent="1" nextAc="seek">
               <p:cTn id="2" dur="indefinite" nodeType="mainSeq">
@@ -7957,14 +7949,14 @@
             <a:noFill/>
           </a:ln>
           <a:extLst>
-            <a:ext uri="{909E8E84-426E-40DD-AFC4-6F175D3DCCD1}">
+            <a:ext uri="{909E8E84-426E-40dd-AFC4-6F175D3DCCD1}">
               <a14:hiddenFill xmlns:a14="http://schemas.microsoft.com/office/drawing/2010/main">
                 <a:solidFill>
                   <a:srgbClr val="FFFFFF"/>
                 </a:solidFill>
               </a14:hiddenFill>
             </a:ext>
-            <a:ext uri="{91240B29-F687-4F45-9708-019B960494DF}">
+            <a:ext uri="{91240B29-F687-4f45-9708-019B960494DF}">
               <a14:hiddenLine xmlns:a14="http://schemas.microsoft.com/office/drawing/2010/main" w="9525">
                 <a:solidFill>
                   <a:srgbClr val="000000"/>
@@ -7998,14 +7990,14 @@
             <a:noFill/>
           </a:ln>
           <a:extLst>
-            <a:ext uri="{909E8E84-426E-40DD-AFC4-6F175D3DCCD1}">
+            <a:ext uri="{909E8E84-426E-40dd-AFC4-6F175D3DCCD1}">
               <a14:hiddenFill xmlns:a14="http://schemas.microsoft.com/office/drawing/2010/main">
                 <a:solidFill>
                   <a:srgbClr val="FFFFFF"/>
                 </a:solidFill>
               </a14:hiddenFill>
             </a:ext>
-            <a:ext uri="{91240B29-F687-4F45-9708-019B960494DF}">
+            <a:ext uri="{91240B29-F687-4f45-9708-019B960494DF}">
               <a14:hiddenLine xmlns:a14="http://schemas.microsoft.com/office/drawing/2010/main" w="9525">
                 <a:solidFill>
                   <a:srgbClr val="000000"/>
@@ -8136,7 +8128,7 @@
   <p:timing>
     <p:tnLst>
       <p:par>
-        <p:cTn id="1" dur="indefinite" restart="never" nodeType="tmRoot"/>
+        <p:cTn xmlns:p14="http://schemas.microsoft.com/office/powerpoint/2010/main" id="1" dur="indefinite" restart="never" nodeType="tmRoot"/>
       </p:par>
     </p:tnLst>
   </p:timing>
@@ -8287,7 +8279,7 @@
   <p:timing>
     <p:tnLst>
       <p:par>
-        <p:cTn id="1" dur="indefinite" restart="never" nodeType="tmRoot"/>
+        <p:cTn xmlns:p14="http://schemas.microsoft.com/office/powerpoint/2010/main" id="1" dur="indefinite" restart="never" nodeType="tmRoot"/>
       </p:par>
     </p:tnLst>
   </p:timing>
@@ -8367,14 +8359,14 @@
             <a:noFill/>
           </a:ln>
           <a:extLst>
-            <a:ext uri="{909E8E84-426E-40DD-AFC4-6F175D3DCCD1}">
+            <a:ext uri="{909E8E84-426E-40dd-AFC4-6F175D3DCCD1}">
               <a14:hiddenFill xmlns:a14="http://schemas.microsoft.com/office/drawing/2010/main">
                 <a:solidFill>
                   <a:srgbClr val="FFFFFF"/>
                 </a:solidFill>
               </a14:hiddenFill>
             </a:ext>
-            <a:ext uri="{91240B29-F687-4F45-9708-019B960494DF}">
+            <a:ext uri="{91240B29-F687-4f45-9708-019B960494DF}">
               <a14:hiddenLine xmlns:a14="http://schemas.microsoft.com/office/drawing/2010/main" w="9525">
                 <a:solidFill>
                   <a:srgbClr val="000000"/>
@@ -8408,14 +8400,14 @@
             <a:noFill/>
           </a:ln>
           <a:extLst>
-            <a:ext uri="{909E8E84-426E-40DD-AFC4-6F175D3DCCD1}">
+            <a:ext uri="{909E8E84-426E-40dd-AFC4-6F175D3DCCD1}">
               <a14:hiddenFill xmlns:a14="http://schemas.microsoft.com/office/drawing/2010/main">
                 <a:solidFill>
                   <a:srgbClr val="FFFFFF"/>
                 </a:solidFill>
               </a14:hiddenFill>
             </a:ext>
-            <a:ext uri="{91240B29-F687-4F45-9708-019B960494DF}">
+            <a:ext uri="{91240B29-F687-4f45-9708-019B960494DF}">
               <a14:hiddenLine xmlns:a14="http://schemas.microsoft.com/office/drawing/2010/main" w="9525">
                 <a:solidFill>
                   <a:srgbClr val="000000"/>
@@ -8546,7 +8538,7 @@
   <p:timing>
     <p:tnLst>
       <p:par>
-        <p:cTn id="1" dur="indefinite" restart="never" nodeType="tmRoot"/>
+        <p:cTn xmlns:p14="http://schemas.microsoft.com/office/powerpoint/2010/main" id="1" dur="indefinite" restart="never" nodeType="tmRoot"/>
       </p:par>
     </p:tnLst>
   </p:timing>
@@ -8689,7 +8681,7 @@
                 <a:tailEnd/>
               </a:ln>
               <a:extLst>
-                <a:ext uri="{909E8E84-426E-40DD-AFC4-6F175D3DCCD1}">
+                <a:ext uri="{909E8E84-426E-40dd-AFC4-6F175D3DCCD1}">
                   <a14:hiddenFill xmlns:a14="http://schemas.microsoft.com/office/drawing/2010/main">
                     <a:solidFill>
                       <a:srgbClr val="FFFFFF"/>
@@ -8732,7 +8724,7 @@
                 <a:tailEnd/>
               </a:ln>
               <a:extLst>
-                <a:ext uri="{909E8E84-426E-40DD-AFC4-6F175D3DCCD1}">
+                <a:ext uri="{909E8E84-426E-40dd-AFC4-6F175D3DCCD1}">
                   <a14:hiddenFill xmlns:a14="http://schemas.microsoft.com/office/drawing/2010/main">
                     <a:noFill/>
                   </a14:hiddenFill>
@@ -8773,7 +8765,7 @@
                 <a:tailEnd/>
               </a:ln>
               <a:extLst>
-                <a:ext uri="{909E8E84-426E-40DD-AFC4-6F175D3DCCD1}">
+                <a:ext uri="{909E8E84-426E-40dd-AFC4-6F175D3DCCD1}">
                   <a14:hiddenFill xmlns:a14="http://schemas.microsoft.com/office/drawing/2010/main">
                     <a:noFill/>
                   </a14:hiddenFill>
@@ -8814,7 +8806,7 @@
                 <a:tailEnd/>
               </a:ln>
               <a:extLst>
-                <a:ext uri="{909E8E84-426E-40DD-AFC4-6F175D3DCCD1}">
+                <a:ext uri="{909E8E84-426E-40dd-AFC4-6F175D3DCCD1}">
                   <a14:hiddenFill xmlns:a14="http://schemas.microsoft.com/office/drawing/2010/main">
                     <a:noFill/>
                   </a14:hiddenFill>
@@ -8855,7 +8847,7 @@
                 <a:tailEnd/>
               </a:ln>
               <a:extLst>
-                <a:ext uri="{909E8E84-426E-40DD-AFC4-6F175D3DCCD1}">
+                <a:ext uri="{909E8E84-426E-40dd-AFC4-6F175D3DCCD1}">
                   <a14:hiddenFill xmlns:a14="http://schemas.microsoft.com/office/drawing/2010/main">
                     <a:noFill/>
                   </a14:hiddenFill>
@@ -8896,7 +8888,7 @@
                 <a:tailEnd/>
               </a:ln>
               <a:extLst>
-                <a:ext uri="{909E8E84-426E-40DD-AFC4-6F175D3DCCD1}">
+                <a:ext uri="{909E8E84-426E-40dd-AFC4-6F175D3DCCD1}">
                   <a14:hiddenFill xmlns:a14="http://schemas.microsoft.com/office/drawing/2010/main">
                     <a:noFill/>
                   </a14:hiddenFill>
@@ -8937,7 +8929,7 @@
                 <a:tailEnd/>
               </a:ln>
               <a:extLst>
-                <a:ext uri="{909E8E84-426E-40DD-AFC4-6F175D3DCCD1}">
+                <a:ext uri="{909E8E84-426E-40dd-AFC4-6F175D3DCCD1}">
                   <a14:hiddenFill xmlns:a14="http://schemas.microsoft.com/office/drawing/2010/main">
                     <a:noFill/>
                   </a14:hiddenFill>
@@ -8978,7 +8970,7 @@
                 <a:tailEnd/>
               </a:ln>
               <a:extLst>
-                <a:ext uri="{909E8E84-426E-40DD-AFC4-6F175D3DCCD1}">
+                <a:ext uri="{909E8E84-426E-40dd-AFC4-6F175D3DCCD1}">
                   <a14:hiddenFill xmlns:a14="http://schemas.microsoft.com/office/drawing/2010/main">
                     <a:noFill/>
                   </a14:hiddenFill>
@@ -9036,7 +9028,7 @@
                 <a:tailEnd/>
               </a:ln>
               <a:extLst>
-                <a:ext uri="{909E8E84-426E-40DD-AFC4-6F175D3DCCD1}">
+                <a:ext uri="{909E8E84-426E-40dd-AFC4-6F175D3DCCD1}">
                   <a14:hiddenFill xmlns:a14="http://schemas.microsoft.com/office/drawing/2010/main">
                     <a:solidFill>
                       <a:srgbClr val="FFFFFF"/>
@@ -9079,7 +9071,7 @@
                 <a:tailEnd/>
               </a:ln>
               <a:extLst>
-                <a:ext uri="{909E8E84-426E-40DD-AFC4-6F175D3DCCD1}">
+                <a:ext uri="{909E8E84-426E-40dd-AFC4-6F175D3DCCD1}">
                   <a14:hiddenFill xmlns:a14="http://schemas.microsoft.com/office/drawing/2010/main">
                     <a:noFill/>
                   </a14:hiddenFill>
@@ -9120,7 +9112,7 @@
                 <a:tailEnd/>
               </a:ln>
               <a:extLst>
-                <a:ext uri="{909E8E84-426E-40DD-AFC4-6F175D3DCCD1}">
+                <a:ext uri="{909E8E84-426E-40dd-AFC4-6F175D3DCCD1}">
                   <a14:hiddenFill xmlns:a14="http://schemas.microsoft.com/office/drawing/2010/main">
                     <a:noFill/>
                   </a14:hiddenFill>
@@ -9161,7 +9153,7 @@
                 <a:tailEnd/>
               </a:ln>
               <a:extLst>
-                <a:ext uri="{909E8E84-426E-40DD-AFC4-6F175D3DCCD1}">
+                <a:ext uri="{909E8E84-426E-40dd-AFC4-6F175D3DCCD1}">
                   <a14:hiddenFill xmlns:a14="http://schemas.microsoft.com/office/drawing/2010/main">
                     <a:noFill/>
                   </a14:hiddenFill>
@@ -9202,7 +9194,7 @@
                 <a:tailEnd/>
               </a:ln>
               <a:extLst>
-                <a:ext uri="{909E8E84-426E-40DD-AFC4-6F175D3DCCD1}">
+                <a:ext uri="{909E8E84-426E-40dd-AFC4-6F175D3DCCD1}">
                   <a14:hiddenFill xmlns:a14="http://schemas.microsoft.com/office/drawing/2010/main">
                     <a:noFill/>
                   </a14:hiddenFill>
@@ -9243,7 +9235,7 @@
                 <a:tailEnd/>
               </a:ln>
               <a:extLst>
-                <a:ext uri="{909E8E84-426E-40DD-AFC4-6F175D3DCCD1}">
+                <a:ext uri="{909E8E84-426E-40dd-AFC4-6F175D3DCCD1}">
                   <a14:hiddenFill xmlns:a14="http://schemas.microsoft.com/office/drawing/2010/main">
                     <a:noFill/>
                   </a14:hiddenFill>
@@ -9284,7 +9276,7 @@
                 <a:tailEnd/>
               </a:ln>
               <a:extLst>
-                <a:ext uri="{909E8E84-426E-40DD-AFC4-6F175D3DCCD1}">
+                <a:ext uri="{909E8E84-426E-40dd-AFC4-6F175D3DCCD1}">
                   <a14:hiddenFill xmlns:a14="http://schemas.microsoft.com/office/drawing/2010/main">
                     <a:noFill/>
                   </a14:hiddenFill>
@@ -9325,7 +9317,7 @@
                 <a:tailEnd/>
               </a:ln>
               <a:extLst>
-                <a:ext uri="{909E8E84-426E-40DD-AFC4-6F175D3DCCD1}">
+                <a:ext uri="{909E8E84-426E-40dd-AFC4-6F175D3DCCD1}">
                   <a14:hiddenFill xmlns:a14="http://schemas.microsoft.com/office/drawing/2010/main">
                     <a:noFill/>
                   </a14:hiddenFill>
@@ -9366,7 +9358,7 @@
                 <a:tailEnd/>
               </a:ln>
               <a:extLst>
-                <a:ext uri="{909E8E84-426E-40DD-AFC4-6F175D3DCCD1}">
+                <a:ext uri="{909E8E84-426E-40dd-AFC4-6F175D3DCCD1}">
                   <a14:hiddenFill xmlns:a14="http://schemas.microsoft.com/office/drawing/2010/main">
                     <a:noFill/>
                   </a14:hiddenFill>
@@ -9407,7 +9399,7 @@
                 <a:tailEnd/>
               </a:ln>
               <a:extLst>
-                <a:ext uri="{909E8E84-426E-40DD-AFC4-6F175D3DCCD1}">
+                <a:ext uri="{909E8E84-426E-40dd-AFC4-6F175D3DCCD1}">
                   <a14:hiddenFill xmlns:a14="http://schemas.microsoft.com/office/drawing/2010/main">
                     <a:noFill/>
                   </a14:hiddenFill>
@@ -9448,7 +9440,7 @@
                 <a:tailEnd/>
               </a:ln>
               <a:extLst>
-                <a:ext uri="{909E8E84-426E-40DD-AFC4-6F175D3DCCD1}">
+                <a:ext uri="{909E8E84-426E-40dd-AFC4-6F175D3DCCD1}">
                   <a14:hiddenFill xmlns:a14="http://schemas.microsoft.com/office/drawing/2010/main">
                     <a:noFill/>
                   </a14:hiddenFill>
@@ -9489,7 +9481,7 @@
                 <a:tailEnd/>
               </a:ln>
               <a:extLst>
-                <a:ext uri="{909E8E84-426E-40DD-AFC4-6F175D3DCCD1}">
+                <a:ext uri="{909E8E84-426E-40dd-AFC4-6F175D3DCCD1}">
                   <a14:hiddenFill xmlns:a14="http://schemas.microsoft.com/office/drawing/2010/main">
                     <a:noFill/>
                   </a14:hiddenFill>
@@ -9530,7 +9522,7 @@
                 <a:tailEnd/>
               </a:ln>
               <a:extLst>
-                <a:ext uri="{909E8E84-426E-40DD-AFC4-6F175D3DCCD1}">
+                <a:ext uri="{909E8E84-426E-40dd-AFC4-6F175D3DCCD1}">
                   <a14:hiddenFill xmlns:a14="http://schemas.microsoft.com/office/drawing/2010/main">
                     <a:noFill/>
                   </a14:hiddenFill>
@@ -9571,7 +9563,7 @@
                 <a:tailEnd/>
               </a:ln>
               <a:extLst>
-                <a:ext uri="{909E8E84-426E-40DD-AFC4-6F175D3DCCD1}">
+                <a:ext uri="{909E8E84-426E-40dd-AFC4-6F175D3DCCD1}">
                   <a14:hiddenFill xmlns:a14="http://schemas.microsoft.com/office/drawing/2010/main">
                     <a:noFill/>
                   </a14:hiddenFill>
@@ -9612,7 +9604,7 @@
                 <a:tailEnd/>
               </a:ln>
               <a:extLst>
-                <a:ext uri="{909E8E84-426E-40DD-AFC4-6F175D3DCCD1}">
+                <a:ext uri="{909E8E84-426E-40dd-AFC4-6F175D3DCCD1}">
                   <a14:hiddenFill xmlns:a14="http://schemas.microsoft.com/office/drawing/2010/main">
                     <a:noFill/>
                   </a14:hiddenFill>
@@ -9654,7 +9646,7 @@
               <a:tailEnd/>
             </a:ln>
             <a:extLst>
-              <a:ext uri="{909E8E84-426E-40DD-AFC4-6F175D3DCCD1}">
+              <a:ext uri="{909E8E84-426E-40dd-AFC4-6F175D3DCCD1}">
                 <a14:hiddenFill xmlns:a14="http://schemas.microsoft.com/office/drawing/2010/main">
                   <a:solidFill>
                     <a:srgbClr val="FFFFFF"/>
@@ -9697,7 +9689,7 @@
               <a:tailEnd/>
             </a:ln>
             <a:extLst>
-              <a:ext uri="{909E8E84-426E-40DD-AFC4-6F175D3DCCD1}">
+              <a:ext uri="{909E8E84-426E-40dd-AFC4-6F175D3DCCD1}">
                 <a14:hiddenFill xmlns:a14="http://schemas.microsoft.com/office/drawing/2010/main">
                   <a:noFill/>
                 </a14:hiddenFill>
@@ -9738,7 +9730,7 @@
               <a:tailEnd/>
             </a:ln>
             <a:extLst>
-              <a:ext uri="{909E8E84-426E-40DD-AFC4-6F175D3DCCD1}">
+              <a:ext uri="{909E8E84-426E-40dd-AFC4-6F175D3DCCD1}">
                 <a14:hiddenFill xmlns:a14="http://schemas.microsoft.com/office/drawing/2010/main">
                   <a:noFill/>
                 </a14:hiddenFill>
@@ -9779,7 +9771,7 @@
               <a:tailEnd/>
             </a:ln>
             <a:extLst>
-              <a:ext uri="{909E8E84-426E-40DD-AFC4-6F175D3DCCD1}">
+              <a:ext uri="{909E8E84-426E-40dd-AFC4-6F175D3DCCD1}">
                 <a14:hiddenFill xmlns:a14="http://schemas.microsoft.com/office/drawing/2010/main">
                   <a:noFill/>
                 </a14:hiddenFill>
@@ -9820,7 +9812,7 @@
               <a:tailEnd/>
             </a:ln>
             <a:extLst>
-              <a:ext uri="{909E8E84-426E-40DD-AFC4-6F175D3DCCD1}">
+              <a:ext uri="{909E8E84-426E-40dd-AFC4-6F175D3DCCD1}">
                 <a14:hiddenFill xmlns:a14="http://schemas.microsoft.com/office/drawing/2010/main">
                   <a:noFill/>
                 </a14:hiddenFill>
@@ -9861,7 +9853,7 @@
               <a:tailEnd/>
             </a:ln>
             <a:extLst>
-              <a:ext uri="{909E8E84-426E-40DD-AFC4-6F175D3DCCD1}">
+              <a:ext uri="{909E8E84-426E-40dd-AFC4-6F175D3DCCD1}">
                 <a14:hiddenFill xmlns:a14="http://schemas.microsoft.com/office/drawing/2010/main">
                   <a:noFill/>
                 </a14:hiddenFill>
@@ -9902,7 +9894,7 @@
               <a:tailEnd/>
             </a:ln>
             <a:extLst>
-              <a:ext uri="{909E8E84-426E-40DD-AFC4-6F175D3DCCD1}">
+              <a:ext uri="{909E8E84-426E-40dd-AFC4-6F175D3DCCD1}">
                 <a14:hiddenFill xmlns:a14="http://schemas.microsoft.com/office/drawing/2010/main">
                   <a:noFill/>
                 </a14:hiddenFill>
@@ -9943,7 +9935,7 @@
               <a:tailEnd/>
             </a:ln>
             <a:extLst>
-              <a:ext uri="{909E8E84-426E-40DD-AFC4-6F175D3DCCD1}">
+              <a:ext uri="{909E8E84-426E-40dd-AFC4-6F175D3DCCD1}">
                 <a14:hiddenFill xmlns:a14="http://schemas.microsoft.com/office/drawing/2010/main">
                   <a:noFill/>
                 </a14:hiddenFill>
@@ -9984,7 +9976,7 @@
               <a:tailEnd/>
             </a:ln>
             <a:extLst>
-              <a:ext uri="{909E8E84-426E-40DD-AFC4-6F175D3DCCD1}">
+              <a:ext uri="{909E8E84-426E-40dd-AFC4-6F175D3DCCD1}">
                 <a14:hiddenFill xmlns:a14="http://schemas.microsoft.com/office/drawing/2010/main">
                   <a:noFill/>
                 </a14:hiddenFill>
@@ -10025,7 +10017,7 @@
               <a:tailEnd/>
             </a:ln>
             <a:extLst>
-              <a:ext uri="{909E8E84-426E-40DD-AFC4-6F175D3DCCD1}">
+              <a:ext uri="{909E8E84-426E-40dd-AFC4-6F175D3DCCD1}">
                 <a14:hiddenFill xmlns:a14="http://schemas.microsoft.com/office/drawing/2010/main">
                   <a:noFill/>
                 </a14:hiddenFill>
@@ -10066,7 +10058,7 @@
               <a:tailEnd/>
             </a:ln>
             <a:extLst>
-              <a:ext uri="{909E8E84-426E-40DD-AFC4-6F175D3DCCD1}">
+              <a:ext uri="{909E8E84-426E-40dd-AFC4-6F175D3DCCD1}">
                 <a14:hiddenFill xmlns:a14="http://schemas.microsoft.com/office/drawing/2010/main">
                   <a:noFill/>
                 </a14:hiddenFill>
@@ -10107,7 +10099,7 @@
               <a:tailEnd/>
             </a:ln>
             <a:extLst>
-              <a:ext uri="{909E8E84-426E-40DD-AFC4-6F175D3DCCD1}">
+              <a:ext uri="{909E8E84-426E-40dd-AFC4-6F175D3DCCD1}">
                 <a14:hiddenFill xmlns:a14="http://schemas.microsoft.com/office/drawing/2010/main">
                   <a:noFill/>
                 </a14:hiddenFill>
@@ -10148,7 +10140,7 @@
               <a:tailEnd/>
             </a:ln>
             <a:extLst>
-              <a:ext uri="{909E8E84-426E-40DD-AFC4-6F175D3DCCD1}">
+              <a:ext uri="{909E8E84-426E-40dd-AFC4-6F175D3DCCD1}">
                 <a14:hiddenFill xmlns:a14="http://schemas.microsoft.com/office/drawing/2010/main">
                   <a:noFill/>
                 </a14:hiddenFill>
@@ -10189,7 +10181,7 @@
               <a:tailEnd/>
             </a:ln>
             <a:extLst>
-              <a:ext uri="{909E8E84-426E-40DD-AFC4-6F175D3DCCD1}">
+              <a:ext uri="{909E8E84-426E-40dd-AFC4-6F175D3DCCD1}">
                 <a14:hiddenFill xmlns:a14="http://schemas.microsoft.com/office/drawing/2010/main">
                   <a:noFill/>
                 </a14:hiddenFill>
@@ -10230,7 +10222,7 @@
               <a:tailEnd/>
             </a:ln>
             <a:extLst>
-              <a:ext uri="{909E8E84-426E-40DD-AFC4-6F175D3DCCD1}">
+              <a:ext uri="{909E8E84-426E-40dd-AFC4-6F175D3DCCD1}">
                 <a14:hiddenFill xmlns:a14="http://schemas.microsoft.com/office/drawing/2010/main">
                   <a:noFill/>
                 </a14:hiddenFill>
@@ -10271,7 +10263,7 @@
               <a:tailEnd/>
             </a:ln>
             <a:extLst>
-              <a:ext uri="{909E8E84-426E-40DD-AFC4-6F175D3DCCD1}">
+              <a:ext uri="{909E8E84-426E-40dd-AFC4-6F175D3DCCD1}">
                 <a14:hiddenFill xmlns:a14="http://schemas.microsoft.com/office/drawing/2010/main">
                   <a:noFill/>
                 </a14:hiddenFill>
@@ -10312,7 +10304,7 @@
               <a:tailEnd/>
             </a:ln>
             <a:extLst>
-              <a:ext uri="{909E8E84-426E-40DD-AFC4-6F175D3DCCD1}">
+              <a:ext uri="{909E8E84-426E-40dd-AFC4-6F175D3DCCD1}">
                 <a14:hiddenFill xmlns:a14="http://schemas.microsoft.com/office/drawing/2010/main">
                   <a:noFill/>
                 </a14:hiddenFill>
@@ -10353,7 +10345,7 @@
               <a:tailEnd/>
             </a:ln>
             <a:extLst>
-              <a:ext uri="{909E8E84-426E-40DD-AFC4-6F175D3DCCD1}">
+              <a:ext uri="{909E8E84-426E-40dd-AFC4-6F175D3DCCD1}">
                 <a14:hiddenFill xmlns:a14="http://schemas.microsoft.com/office/drawing/2010/main">
                   <a:noFill/>
                 </a14:hiddenFill>
@@ -10394,7 +10386,7 @@
               <a:tailEnd/>
             </a:ln>
             <a:extLst>
-              <a:ext uri="{909E8E84-426E-40DD-AFC4-6F175D3DCCD1}">
+              <a:ext uri="{909E8E84-426E-40dd-AFC4-6F175D3DCCD1}">
                 <a14:hiddenFill xmlns:a14="http://schemas.microsoft.com/office/drawing/2010/main">
                   <a:noFill/>
                 </a14:hiddenFill>
@@ -10435,7 +10427,7 @@
               <a:tailEnd/>
             </a:ln>
             <a:extLst>
-              <a:ext uri="{909E8E84-426E-40DD-AFC4-6F175D3DCCD1}">
+              <a:ext uri="{909E8E84-426E-40dd-AFC4-6F175D3DCCD1}">
                 <a14:hiddenFill xmlns:a14="http://schemas.microsoft.com/office/drawing/2010/main">
                   <a:noFill/>
                 </a14:hiddenFill>
@@ -10476,7 +10468,7 @@
               <a:tailEnd/>
             </a:ln>
             <a:extLst>
-              <a:ext uri="{909E8E84-426E-40DD-AFC4-6F175D3DCCD1}">
+              <a:ext uri="{909E8E84-426E-40dd-AFC4-6F175D3DCCD1}">
                 <a14:hiddenFill xmlns:a14="http://schemas.microsoft.com/office/drawing/2010/main">
                   <a:noFill/>
                 </a14:hiddenFill>
@@ -10517,7 +10509,7 @@
               <a:tailEnd/>
             </a:ln>
             <a:extLst>
-              <a:ext uri="{909E8E84-426E-40DD-AFC4-6F175D3DCCD1}">
+              <a:ext uri="{909E8E84-426E-40dd-AFC4-6F175D3DCCD1}">
                 <a14:hiddenFill xmlns:a14="http://schemas.microsoft.com/office/drawing/2010/main">
                   <a:noFill/>
                 </a14:hiddenFill>
@@ -10558,7 +10550,7 @@
               <a:tailEnd/>
             </a:ln>
             <a:extLst>
-              <a:ext uri="{909E8E84-426E-40DD-AFC4-6F175D3DCCD1}">
+              <a:ext uri="{909E8E84-426E-40dd-AFC4-6F175D3DCCD1}">
                 <a14:hiddenFill xmlns:a14="http://schemas.microsoft.com/office/drawing/2010/main">
                   <a:noFill/>
                 </a14:hiddenFill>
@@ -10599,7 +10591,7 @@
               <a:tailEnd/>
             </a:ln>
             <a:extLst>
-              <a:ext uri="{909E8E84-426E-40DD-AFC4-6F175D3DCCD1}">
+              <a:ext uri="{909E8E84-426E-40dd-AFC4-6F175D3DCCD1}">
                 <a14:hiddenFill xmlns:a14="http://schemas.microsoft.com/office/drawing/2010/main">
                   <a:noFill/>
                 </a14:hiddenFill>
@@ -10640,7 +10632,7 @@
               <a:tailEnd/>
             </a:ln>
             <a:extLst>
-              <a:ext uri="{909E8E84-426E-40DD-AFC4-6F175D3DCCD1}">
+              <a:ext uri="{909E8E84-426E-40dd-AFC4-6F175D3DCCD1}">
                 <a14:hiddenFill xmlns:a14="http://schemas.microsoft.com/office/drawing/2010/main">
                   <a:noFill/>
                 </a14:hiddenFill>
@@ -10681,7 +10673,7 @@
               <a:tailEnd/>
             </a:ln>
             <a:extLst>
-              <a:ext uri="{909E8E84-426E-40DD-AFC4-6F175D3DCCD1}">
+              <a:ext uri="{909E8E84-426E-40dd-AFC4-6F175D3DCCD1}">
                 <a14:hiddenFill xmlns:a14="http://schemas.microsoft.com/office/drawing/2010/main">
                   <a:noFill/>
                 </a14:hiddenFill>
@@ -10722,7 +10714,7 @@
               <a:tailEnd/>
             </a:ln>
             <a:extLst>
-              <a:ext uri="{909E8E84-426E-40DD-AFC4-6F175D3DCCD1}">
+              <a:ext uri="{909E8E84-426E-40dd-AFC4-6F175D3DCCD1}">
                 <a14:hiddenFill xmlns:a14="http://schemas.microsoft.com/office/drawing/2010/main">
                   <a:noFill/>
                 </a14:hiddenFill>
@@ -10763,7 +10755,7 @@
               <a:tailEnd/>
             </a:ln>
             <a:extLst>
-              <a:ext uri="{909E8E84-426E-40DD-AFC4-6F175D3DCCD1}">
+              <a:ext uri="{909E8E84-426E-40dd-AFC4-6F175D3DCCD1}">
                 <a14:hiddenFill xmlns:a14="http://schemas.microsoft.com/office/drawing/2010/main">
                   <a:noFill/>
                 </a14:hiddenFill>
@@ -10804,7 +10796,7 @@
               <a:tailEnd/>
             </a:ln>
             <a:extLst>
-              <a:ext uri="{909E8E84-426E-40DD-AFC4-6F175D3DCCD1}">
+              <a:ext uri="{909E8E84-426E-40dd-AFC4-6F175D3DCCD1}">
                 <a14:hiddenFill xmlns:a14="http://schemas.microsoft.com/office/drawing/2010/main">
                   <a:noFill/>
                 </a14:hiddenFill>
@@ -10845,7 +10837,7 @@
               <a:tailEnd/>
             </a:ln>
             <a:extLst>
-              <a:ext uri="{909E8E84-426E-40DD-AFC4-6F175D3DCCD1}">
+              <a:ext uri="{909E8E84-426E-40dd-AFC4-6F175D3DCCD1}">
                 <a14:hiddenFill xmlns:a14="http://schemas.microsoft.com/office/drawing/2010/main">
                   <a:noFill/>
                 </a14:hiddenFill>
@@ -10886,7 +10878,7 @@
               <a:tailEnd/>
             </a:ln>
             <a:extLst>
-              <a:ext uri="{909E8E84-426E-40DD-AFC4-6F175D3DCCD1}">
+              <a:ext uri="{909E8E84-426E-40dd-AFC4-6F175D3DCCD1}">
                 <a14:hiddenFill xmlns:a14="http://schemas.microsoft.com/office/drawing/2010/main">
                   <a:noFill/>
                 </a14:hiddenFill>
@@ -10927,7 +10919,7 @@
               <a:tailEnd/>
             </a:ln>
             <a:extLst>
-              <a:ext uri="{909E8E84-426E-40DD-AFC4-6F175D3DCCD1}">
+              <a:ext uri="{909E8E84-426E-40dd-AFC4-6F175D3DCCD1}">
                 <a14:hiddenFill xmlns:a14="http://schemas.microsoft.com/office/drawing/2010/main">
                   <a:noFill/>
                 </a14:hiddenFill>
@@ -10968,7 +10960,7 @@
               <a:tailEnd/>
             </a:ln>
             <a:extLst>
-              <a:ext uri="{909E8E84-426E-40DD-AFC4-6F175D3DCCD1}">
+              <a:ext uri="{909E8E84-426E-40dd-AFC4-6F175D3DCCD1}">
                 <a14:hiddenFill xmlns:a14="http://schemas.microsoft.com/office/drawing/2010/main">
                   <a:noFill/>
                 </a14:hiddenFill>
@@ -11009,7 +11001,7 @@
               <a:tailEnd/>
             </a:ln>
             <a:extLst>
-              <a:ext uri="{909E8E84-426E-40DD-AFC4-6F175D3DCCD1}">
+              <a:ext uri="{909E8E84-426E-40dd-AFC4-6F175D3DCCD1}">
                 <a14:hiddenFill xmlns:a14="http://schemas.microsoft.com/office/drawing/2010/main">
                   <a:noFill/>
                 </a14:hiddenFill>
@@ -11050,7 +11042,7 @@
               <a:tailEnd/>
             </a:ln>
             <a:extLst>
-              <a:ext uri="{909E8E84-426E-40DD-AFC4-6F175D3DCCD1}">
+              <a:ext uri="{909E8E84-426E-40dd-AFC4-6F175D3DCCD1}">
                 <a14:hiddenFill xmlns:a14="http://schemas.microsoft.com/office/drawing/2010/main">
                   <a:noFill/>
                 </a14:hiddenFill>
@@ -11091,7 +11083,7 @@
               <a:tailEnd/>
             </a:ln>
             <a:extLst>
-              <a:ext uri="{909E8E84-426E-40DD-AFC4-6F175D3DCCD1}">
+              <a:ext uri="{909E8E84-426E-40dd-AFC4-6F175D3DCCD1}">
                 <a14:hiddenFill xmlns:a14="http://schemas.microsoft.com/office/drawing/2010/main">
                   <a:noFill/>
                 </a14:hiddenFill>
@@ -11115,7 +11107,7 @@
   <p:timing>
     <p:tnLst>
       <p:par>
-        <p:cTn id="1" dur="indefinite" restart="never" nodeType="tmRoot"/>
+        <p:cTn xmlns:p14="http://schemas.microsoft.com/office/powerpoint/2010/main" id="1" dur="indefinite" restart="never" nodeType="tmRoot"/>
       </p:par>
     </p:tnLst>
   </p:timing>
@@ -11182,21 +11174,21 @@
           <a:lstStyle/>
           <a:p>
             <a:r>
-              <a:rPr lang="en-US" i="1" smtClean="0"/>
+              <a:rPr lang="en-US" i="1" dirty="0" smtClean="0"/>
               <a:t>Thread ID</a:t>
             </a:r>
             <a:r>
-              <a:rPr lang="en-US" smtClean="0"/>
+              <a:rPr lang="en-US" dirty="0" smtClean="0"/>
               <a:t>:  Scalar thread identifier</a:t>
             </a:r>
           </a:p>
           <a:p>
             <a:r>
-              <a:rPr lang="en-US" smtClean="0"/>
+              <a:rPr lang="en-US" dirty="0" smtClean="0"/>
               <a:t>Thread Index:  </a:t>
             </a:r>
             <a:r>
-              <a:rPr lang="en-US" smtClean="0">
+              <a:rPr lang="en-US" dirty="0" err="1" smtClean="0">
                 <a:solidFill>
                   <a:srgbClr val="9933FF"/>
                 </a:solidFill>
@@ -11204,20 +11196,119 @@
               </a:rPr>
               <a:t>threadIdx</a:t>
             </a:r>
-          </a:p>
-          <a:p>
-            <a:endParaRPr lang="en-US" smtClean="0"/>
-          </a:p>
-          <a:p>
+            <a:endParaRPr lang="en-US" dirty="0" smtClean="0">
+              <a:solidFill>
+                <a:srgbClr val="9933FF"/>
+              </a:solidFill>
+              <a:latin typeface="Courier New" pitchFamily="49" charset="0"/>
+            </a:endParaRPr>
+          </a:p>
+          <a:p>
+            <a:endParaRPr lang="en-US" dirty="0" smtClean="0"/>
+          </a:p>
+          <a:p>
+            <a:r>
+              <a:rPr lang="en-US" dirty="0" smtClean="0"/>
+              <a:t>1D: Thread ID == Thread Index</a:t>
+            </a:r>
+          </a:p>
+          <a:p>
+            <a:r>
+              <a:rPr lang="en-US" dirty="0" smtClean="0"/>
+              <a:t>2D with size (</a:t>
+            </a:r>
+            <a:r>
+              <a:rPr lang="en-US" dirty="0" err="1" smtClean="0"/>
+              <a:t>D</a:t>
+            </a:r>
+            <a:r>
+              <a:rPr lang="en-US" baseline="-25000" dirty="0" err="1" smtClean="0"/>
+              <a:t>x</a:t>
+            </a:r>
+            <a:r>
+              <a:rPr lang="en-US" dirty="0" smtClean="0"/>
+              <a:t>, </a:t>
+            </a:r>
+            <a:r>
+              <a:rPr lang="en-US" dirty="0" err="1" smtClean="0"/>
+              <a:t>D</a:t>
+            </a:r>
+            <a:r>
+              <a:rPr lang="en-US" baseline="-25000" dirty="0" err="1" smtClean="0"/>
+              <a:t>y</a:t>
+            </a:r>
+            <a:r>
+              <a:rPr lang="en-US" dirty="0" smtClean="0"/>
+              <a:t>)</a:t>
+            </a:r>
+          </a:p>
+          <a:p>
+            <a:pPr lvl="1"/>
+            <a:r>
+              <a:rPr lang="en-US" dirty="0" smtClean="0"/>
+              <a:t>Thread ID of index (x, y) == x + y </a:t>
+            </a:r>
+            <a:r>
+              <a:rPr lang="en-US" dirty="0" err="1" smtClean="0"/>
+              <a:t>D</a:t>
+            </a:r>
+            <a:r>
+              <a:rPr lang="en-US" baseline="-25000" dirty="0" err="1" smtClean="0"/>
+              <a:t>x</a:t>
+            </a:r>
+            <a:endParaRPr lang="en-US" baseline="-25000" dirty="0" smtClean="0"/>
+          </a:p>
+          <a:p>
+            <a:r>
+              <a:rPr lang="en-US" dirty="0" smtClean="0"/>
+              <a:t>3D with size (</a:t>
+            </a:r>
+            <a:r>
+              <a:rPr lang="en-US" dirty="0" err="1" smtClean="0"/>
+              <a:t>D</a:t>
+            </a:r>
+            <a:r>
+              <a:rPr lang="en-US" baseline="-25000" dirty="0" err="1" smtClean="0"/>
+              <a:t>x</a:t>
+            </a:r>
+            <a:r>
+              <a:rPr lang="en-US" dirty="0" smtClean="0"/>
+              <a:t>, </a:t>
+            </a:r>
+            <a:r>
+              <a:rPr lang="en-US" dirty="0" err="1" smtClean="0"/>
+              <a:t>D</a:t>
+            </a:r>
+            <a:r>
+              <a:rPr lang="en-US" baseline="-25000" dirty="0" err="1" smtClean="0"/>
+              <a:t>y</a:t>
+            </a:r>
+            <a:r>
+              <a:rPr lang="en-US" baseline="-25000" dirty="0" smtClean="0"/>
+              <a:t>, </a:t>
+            </a:r>
+            <a:r>
+              <a:rPr lang="en-US" dirty="0" err="1" smtClean="0"/>
+              <a:t>D</a:t>
+            </a:r>
+            <a:r>
+              <a:rPr lang="en-US" baseline="-25000" dirty="0" err="1" smtClean="0"/>
+              <a:t>z</a:t>
+            </a:r>
+            <a:r>
+              <a:rPr lang="en-US" dirty="0" smtClean="0"/>
+              <a:t>)</a:t>
+            </a:r>
+          </a:p>
+          <a:p>
+            <a:pPr lvl="1"/>
+            <a:r>
+              <a:rPr lang="en-US" dirty="0" smtClean="0"/>
+              <a:t>Thread ID of index (x, y, z) == x + y </a:t>
+            </a:r>
             <a:r>
               <a:rPr lang="en-US" smtClean="0"/>
-              <a:t>1D: Thread ID == Thread Index</a:t>
-            </a:r>
-          </a:p>
-          <a:p>
-            <a:r>
-              <a:rPr lang="en-US" smtClean="0"/>
-              <a:t>2D with size (D</a:t>
+              <a:t>D</a:t>
             </a:r>
             <a:r>
               <a:rPr lang="en-US" baseline="-25000" smtClean="0"/>
@@ -11225,91 +11316,39 @@
             </a:r>
             <a:r>
               <a:rPr lang="en-US" smtClean="0"/>
-              <a:t>, D</a:t>
-            </a:r>
-            <a:r>
-              <a:rPr lang="en-US" baseline="-25000" smtClean="0"/>
+              <a:t> </a:t>
+            </a:r>
+            <a:r>
+              <a:rPr lang="en-US" dirty="0" smtClean="0"/>
+              <a:t>+ z </a:t>
+            </a:r>
+            <a:r>
+              <a:rPr lang="en-US" dirty="0" err="1" smtClean="0"/>
+              <a:t>D</a:t>
+            </a:r>
+            <a:r>
+              <a:rPr lang="en-US" baseline="-25000" dirty="0" err="1" smtClean="0"/>
+              <a:t>x</a:t>
+            </a:r>
+            <a:r>
+              <a:rPr lang="en-US" baseline="-25000" dirty="0" smtClean="0"/>
+              <a:t> </a:t>
+            </a:r>
+            <a:r>
+              <a:rPr lang="en-US" dirty="0" err="1" smtClean="0"/>
+              <a:t>D</a:t>
+            </a:r>
+            <a:r>
+              <a:rPr lang="en-US" baseline="-25000" dirty="0" err="1" smtClean="0"/>
               <a:t>y</a:t>
             </a:r>
-            <a:r>
-              <a:rPr lang="en-US" smtClean="0"/>
-              <a:t>)</a:t>
-            </a:r>
-          </a:p>
-          <a:p>
-            <a:pPr lvl="1"/>
-            <a:r>
-              <a:rPr lang="en-US" smtClean="0"/>
-              <a:t>Thread ID of index (x, y) == x + y D</a:t>
-            </a:r>
-            <a:r>
-              <a:rPr lang="en-US" baseline="-25000" smtClean="0"/>
-              <a:t>y</a:t>
-            </a:r>
-          </a:p>
-          <a:p>
-            <a:r>
-              <a:rPr lang="en-US" smtClean="0"/>
-              <a:t>3D with size (D</a:t>
-            </a:r>
-            <a:r>
-              <a:rPr lang="en-US" baseline="-25000" smtClean="0"/>
-              <a:t>x</a:t>
-            </a:r>
-            <a:r>
-              <a:rPr lang="en-US" smtClean="0"/>
-              <a:t>, D</a:t>
-            </a:r>
-            <a:r>
-              <a:rPr lang="en-US" baseline="-25000" smtClean="0"/>
-              <a:t>y, </a:t>
-            </a:r>
-            <a:r>
-              <a:rPr lang="en-US" smtClean="0"/>
-              <a:t>D</a:t>
-            </a:r>
-            <a:r>
-              <a:rPr lang="en-US" baseline="-25000" smtClean="0"/>
-              <a:t>z</a:t>
-            </a:r>
-            <a:r>
-              <a:rPr lang="en-US" smtClean="0"/>
-              <a:t>)</a:t>
-            </a:r>
-          </a:p>
-          <a:p>
-            <a:pPr lvl="1"/>
-            <a:r>
-              <a:rPr lang="en-US" smtClean="0"/>
-              <a:t>Thread ID of index (x, y, z) == x + y D</a:t>
-            </a:r>
-            <a:r>
-              <a:rPr lang="en-US" baseline="-25000" smtClean="0"/>
-              <a:t>y</a:t>
-            </a:r>
-            <a:r>
-              <a:rPr lang="en-US" smtClean="0"/>
-              <a:t> + z D</a:t>
-            </a:r>
-            <a:r>
-              <a:rPr lang="en-US" baseline="-25000" smtClean="0"/>
-              <a:t>x </a:t>
-            </a:r>
-            <a:r>
-              <a:rPr lang="en-US" smtClean="0"/>
-              <a:t>D</a:t>
-            </a:r>
-            <a:r>
-              <a:rPr lang="en-US" baseline="-25000" smtClean="0"/>
-              <a:t>y</a:t>
-            </a:r>
-            <a:endParaRPr lang="en-US" smtClean="0"/>
-          </a:p>
-          <a:p>
-            <a:endParaRPr lang="en-US" smtClean="0"/>
-          </a:p>
-          <a:p>
-            <a:endParaRPr lang="en-US" smtClean="0"/>
+            <a:endParaRPr lang="en-US" dirty="0" smtClean="0"/>
+          </a:p>
+          <a:p>
+            <a:endParaRPr lang="en-US" dirty="0" smtClean="0"/>
+          </a:p>
+          <a:p>
+            <a:endParaRPr lang="en-US" dirty="0" smtClean="0"/>
           </a:p>
         </p:txBody>
       </p:sp>
@@ -11321,7 +11360,7 @@
   <p:timing>
     <p:tnLst>
       <p:par>
-        <p:cTn id="1" dur="indefinite" restart="never" nodeType="tmRoot"/>
+        <p:cTn xmlns:p14="http://schemas.microsoft.com/office/powerpoint/2010/main" id="1" dur="indefinite" restart="never" nodeType="tmRoot"/>
       </p:par>
     </p:tnLst>
   </p:timing>
@@ -11401,14 +11440,14 @@
             <a:noFill/>
           </a:ln>
           <a:extLst>
-            <a:ext uri="{909E8E84-426E-40DD-AFC4-6F175D3DCCD1}">
+            <a:ext uri="{909E8E84-426E-40dd-AFC4-6F175D3DCCD1}">
               <a14:hiddenFill xmlns:a14="http://schemas.microsoft.com/office/drawing/2010/main">
                 <a:solidFill>
                   <a:srgbClr val="FFFFFF"/>
                 </a:solidFill>
               </a14:hiddenFill>
             </a:ext>
-            <a:ext uri="{91240B29-F687-4F45-9708-019B960494DF}">
+            <a:ext uri="{91240B29-F687-4f45-9708-019B960494DF}">
               <a14:hiddenLine xmlns:a14="http://schemas.microsoft.com/office/drawing/2010/main" w="9525">
                 <a:solidFill>
                   <a:srgbClr val="000000"/>
@@ -11463,7 +11502,7 @@
               <a:tailEnd/>
             </a:ln>
             <a:extLst>
-              <a:ext uri="{909E8E84-426E-40DD-AFC4-6F175D3DCCD1}">
+              <a:ext uri="{909E8E84-426E-40dd-AFC4-6F175D3DCCD1}">
                 <a14:hiddenFill xmlns:a14="http://schemas.microsoft.com/office/drawing/2010/main">
                   <a:solidFill>
                     <a:srgbClr val="FFFFFF"/>
@@ -11613,7 +11652,7 @@
               <a:tailEnd/>
             </a:ln>
             <a:extLst>
-              <a:ext uri="{909E8E84-426E-40DD-AFC4-6F175D3DCCD1}">
+              <a:ext uri="{909E8E84-426E-40dd-AFC4-6F175D3DCCD1}">
                 <a14:hiddenFill xmlns:a14="http://schemas.microsoft.com/office/drawing/2010/main">
                   <a:solidFill>
                     <a:srgbClr val="FFFFFF"/>
@@ -11662,7 +11701,7 @@
               <a:tailEnd type="triangle" w="med" len="med"/>
             </a:ln>
             <a:extLst>
-              <a:ext uri="{909E8E84-426E-40DD-AFC4-6F175D3DCCD1}">
+              <a:ext uri="{909E8E84-426E-40dd-AFC4-6F175D3DCCD1}">
                 <a14:hiddenFill xmlns:a14="http://schemas.microsoft.com/office/drawing/2010/main">
                   <a:noFill/>
                 </a14:hiddenFill>
@@ -11713,7 +11752,7 @@
               <a:tailEnd/>
             </a:ln>
             <a:extLst>
-              <a:ext uri="{909E8E84-426E-40DD-AFC4-6F175D3DCCD1}">
+              <a:ext uri="{909E8E84-426E-40dd-AFC4-6F175D3DCCD1}">
                 <a14:hiddenFill xmlns:a14="http://schemas.microsoft.com/office/drawing/2010/main">
                   <a:solidFill>
                     <a:srgbClr val="FFFFFF"/>
@@ -11863,7 +11902,7 @@
               <a:tailEnd/>
             </a:ln>
             <a:extLst>
-              <a:ext uri="{909E8E84-426E-40DD-AFC4-6F175D3DCCD1}">
+              <a:ext uri="{909E8E84-426E-40dd-AFC4-6F175D3DCCD1}">
                 <a14:hiddenFill xmlns:a14="http://schemas.microsoft.com/office/drawing/2010/main">
                   <a:solidFill>
                     <a:srgbClr val="FFFFFF"/>
@@ -11913,7 +11952,7 @@
               <a:tailEnd type="triangle" w="med" len="med"/>
             </a:ln>
             <a:extLst>
-              <a:ext uri="{909E8E84-426E-40DD-AFC4-6F175D3DCCD1}">
+              <a:ext uri="{909E8E84-426E-40dd-AFC4-6F175D3DCCD1}">
                 <a14:hiddenFill xmlns:a14="http://schemas.microsoft.com/office/drawing/2010/main">
                   <a:noFill/>
                 </a14:hiddenFill>
@@ -11964,7 +12003,7 @@
               <a:tailEnd/>
             </a:ln>
             <a:extLst>
-              <a:ext uri="{909E8E84-426E-40DD-AFC4-6F175D3DCCD1}">
+              <a:ext uri="{909E8E84-426E-40dd-AFC4-6F175D3DCCD1}">
                 <a14:hiddenFill xmlns:a14="http://schemas.microsoft.com/office/drawing/2010/main">
                   <a:solidFill>
                     <a:srgbClr val="FFFFFF"/>
@@ -12114,7 +12153,7 @@
               <a:tailEnd/>
             </a:ln>
             <a:extLst>
-              <a:ext uri="{909E8E84-426E-40DD-AFC4-6F175D3DCCD1}">
+              <a:ext uri="{909E8E84-426E-40dd-AFC4-6F175D3DCCD1}">
                 <a14:hiddenFill xmlns:a14="http://schemas.microsoft.com/office/drawing/2010/main">
                   <a:solidFill>
                     <a:srgbClr val="FFFFFF"/>
@@ -12164,7 +12203,7 @@
               <a:tailEnd type="triangle" w="med" len="med"/>
             </a:ln>
             <a:extLst>
-              <a:ext uri="{909E8E84-426E-40DD-AFC4-6F175D3DCCD1}">
+              <a:ext uri="{909E8E84-426E-40dd-AFC4-6F175D3DCCD1}">
                 <a14:hiddenFill xmlns:a14="http://schemas.microsoft.com/office/drawing/2010/main">
                   <a:noFill/>
                 </a14:hiddenFill>
@@ -12181,7 +12220,7 @@
   <p:timing>
     <p:tnLst>
       <p:par>
-        <p:cTn id="1" dur="indefinite" restart="never" nodeType="tmRoot">
+        <p:cTn xmlns:p14="http://schemas.microsoft.com/office/powerpoint/2010/main" id="1" dur="indefinite" restart="never" nodeType="tmRoot">
           <p:childTnLst>
             <p:seq concurrent="1" nextAc="seek">
               <p:cTn id="2" dur="indefinite" nodeType="mainSeq">
@@ -12431,11 +12470,7 @@
             </a:r>
             <a:r>
               <a:rPr lang="en-US" dirty="0" smtClean="0"/>
-              <a:t>:  </a:t>
-            </a:r>
-            <a:r>
-              <a:rPr lang="en-US" dirty="0" smtClean="0"/>
-              <a:t>Up to 1024 threads</a:t>
+              <a:t>:  Up to 1024 threads</a:t>
             </a:r>
           </a:p>
           <a:p>
@@ -12462,7 +12497,7 @@
   <p:timing>
     <p:tnLst>
       <p:par>
-        <p:cTn id="1" dur="indefinite" restart="never" nodeType="tmRoot"/>
+        <p:cTn xmlns:p14="http://schemas.microsoft.com/office/powerpoint/2010/main" id="1" dur="indefinite" restart="never" nodeType="tmRoot"/>
       </p:par>
     </p:tnLst>
   </p:timing>
@@ -12554,11 +12589,7 @@
             </a:r>
             <a:r>
               <a:rPr lang="en-US" dirty="0" smtClean="0"/>
-              <a:t>:  </a:t>
-            </a:r>
-            <a:r>
-              <a:rPr lang="en-US" dirty="0" smtClean="0"/>
-              <a:t>Up to 1024 threads</a:t>
+              <a:t>:  Up to 1024 threads</a:t>
             </a:r>
           </a:p>
           <a:p>
@@ -12598,14 +12629,14 @@
             <a:noFill/>
           </a:ln>
           <a:extLst>
-            <a:ext uri="{909E8E84-426E-40DD-AFC4-6F175D3DCCD1}">
+            <a:ext uri="{909E8E84-426E-40dd-AFC4-6F175D3DCCD1}">
               <a14:hiddenFill xmlns:a14="http://schemas.microsoft.com/office/drawing/2010/main">
                 <a:solidFill>
                   <a:srgbClr val="FFFFFF"/>
                 </a:solidFill>
               </a14:hiddenFill>
             </a:ext>
-            <a:ext uri="{91240B29-F687-4F45-9708-019B960494DF}">
+            <a:ext uri="{91240B29-F687-4f45-9708-019B960494DF}">
               <a14:hiddenLine xmlns:a14="http://schemas.microsoft.com/office/drawing/2010/main" w="9525">
                 <a:solidFill>
                   <a:srgbClr val="000000"/>
@@ -12762,14 +12793,14 @@
             <a:noFill/>
           </a:ln>
           <a:extLst>
-            <a:ext uri="{909E8E84-426E-40DD-AFC4-6F175D3DCCD1}">
+            <a:ext uri="{909E8E84-426E-40dd-AFC4-6F175D3DCCD1}">
               <a14:hiddenFill xmlns:a14="http://schemas.microsoft.com/office/drawing/2010/main">
                 <a:solidFill>
                   <a:srgbClr val="FFFFFF"/>
                 </a:solidFill>
               </a14:hiddenFill>
             </a:ext>
-            <a:ext uri="{91240B29-F687-4F45-9708-019B960494DF}">
+            <a:ext uri="{91240B29-F687-4f45-9708-019B960494DF}">
               <a14:hiddenLine xmlns:a14="http://schemas.microsoft.com/office/drawing/2010/main" w="9525">
                 <a:solidFill>
                   <a:srgbClr val="000000"/>
@@ -12828,7 +12859,7 @@
   <p:timing>
     <p:tnLst>
       <p:par>
-        <p:cTn id="1" dur="indefinite" restart="never" nodeType="tmRoot"/>
+        <p:cTn xmlns:p14="http://schemas.microsoft.com/office/powerpoint/2010/main" id="1" dur="indefinite" restart="never" nodeType="tmRoot"/>
       </p:par>
     </p:tnLst>
   </p:timing>
@@ -12892,13 +12923,8 @@
           <a:p>
             <a:r>
               <a:rPr lang="en-US" dirty="0" smtClean="0"/>
-              <a:t>Project 0 due </a:t>
-            </a:r>
-            <a:r>
-              <a:rPr lang="en-US" dirty="0" smtClean="0"/>
-              <a:t>today</a:t>
-            </a:r>
-            <a:endParaRPr lang="en-US" dirty="0" smtClean="0"/>
+              <a:t>Project 0 due today</a:t>
+            </a:r>
           </a:p>
           <a:p>
             <a:r>
@@ -12910,13 +12936,8 @@
             <a:pPr lvl="1"/>
             <a:r>
               <a:rPr lang="en-US" dirty="0" smtClean="0"/>
-              <a:t>Released </a:t>
-            </a:r>
-            <a:r>
-              <a:rPr lang="en-US" dirty="0" smtClean="0"/>
-              <a:t>today</a:t>
-            </a:r>
-            <a:endParaRPr lang="en-US" dirty="0" smtClean="0"/>
+              <a:t>Released today</a:t>
+            </a:r>
           </a:p>
           <a:p>
             <a:pPr lvl="1"/>
@@ -13088,7 +13109,7 @@
   <p:timing>
     <p:tnLst>
       <p:par>
-        <p:cTn id="1" dur="indefinite" restart="never" nodeType="tmRoot"/>
+        <p:cTn xmlns:p14="http://schemas.microsoft.com/office/powerpoint/2010/main" id="1" dur="indefinite" restart="never" nodeType="tmRoot"/>
       </p:par>
     </p:tnLst>
   </p:timing>
@@ -13184,14 +13205,14 @@
               <a:noFill/>
             </a:ln>
             <a:extLst>
-              <a:ext uri="{909E8E84-426E-40DD-AFC4-6F175D3DCCD1}">
+              <a:ext uri="{909E8E84-426E-40dd-AFC4-6F175D3DCCD1}">
                 <a14:hiddenFill xmlns:a14="http://schemas.microsoft.com/office/drawing/2010/main">
                   <a:solidFill>
                     <a:srgbClr val="FFFFFF"/>
                   </a:solidFill>
                 </a14:hiddenFill>
               </a:ext>
-              <a:ext uri="{91240B29-F687-4F45-9708-019B960494DF}">
+              <a:ext uri="{91240B29-F687-4f45-9708-019B960494DF}">
                 <a14:hiddenLine xmlns:a14="http://schemas.microsoft.com/office/drawing/2010/main" w="9525">
                   <a:solidFill>
                     <a:srgbClr val="000000"/>
@@ -13238,14 +13259,14 @@
               <a:noFill/>
             </a:ln>
             <a:extLst>
-              <a:ext uri="{909E8E84-426E-40DD-AFC4-6F175D3DCCD1}">
+              <a:ext uri="{909E8E84-426E-40dd-AFC4-6F175D3DCCD1}">
                 <a14:hiddenFill xmlns:a14="http://schemas.microsoft.com/office/drawing/2010/main">
                   <a:solidFill>
                     <a:srgbClr val="FFFFFF"/>
                   </a:solidFill>
                 </a14:hiddenFill>
               </a:ext>
-              <a:ext uri="{91240B29-F687-4F45-9708-019B960494DF}">
+              <a:ext uri="{91240B29-F687-4f45-9708-019B960494DF}">
                 <a14:hiddenLine xmlns:a14="http://schemas.microsoft.com/office/drawing/2010/main" w="9525">
                   <a:solidFill>
                     <a:srgbClr val="000000"/>
@@ -13301,7 +13322,7 @@
               <a:tailEnd/>
             </a:ln>
             <a:extLst>
-              <a:ext uri="{909E8E84-426E-40DD-AFC4-6F175D3DCCD1}">
+              <a:ext uri="{909E8E84-426E-40dd-AFC4-6F175D3DCCD1}">
                 <a14:hiddenFill xmlns:a14="http://schemas.microsoft.com/office/drawing/2010/main">
                   <a:solidFill>
                     <a:srgbClr val="FFFFFF"/>
@@ -13451,7 +13472,7 @@
               <a:tailEnd/>
             </a:ln>
             <a:extLst>
-              <a:ext uri="{909E8E84-426E-40DD-AFC4-6F175D3DCCD1}">
+              <a:ext uri="{909E8E84-426E-40dd-AFC4-6F175D3DCCD1}">
                 <a14:hiddenFill xmlns:a14="http://schemas.microsoft.com/office/drawing/2010/main">
                   <a:solidFill>
                     <a:srgbClr val="FFFFFF"/>
@@ -13500,7 +13521,7 @@
               <a:tailEnd type="triangle" w="med" len="med"/>
             </a:ln>
             <a:extLst>
-              <a:ext uri="{909E8E84-426E-40DD-AFC4-6F175D3DCCD1}">
+              <a:ext uri="{909E8E84-426E-40dd-AFC4-6F175D3DCCD1}">
                 <a14:hiddenFill xmlns:a14="http://schemas.microsoft.com/office/drawing/2010/main">
                   <a:noFill/>
                 </a14:hiddenFill>
@@ -13551,7 +13572,7 @@
               <a:tailEnd/>
             </a:ln>
             <a:extLst>
-              <a:ext uri="{909E8E84-426E-40DD-AFC4-6F175D3DCCD1}">
+              <a:ext uri="{909E8E84-426E-40dd-AFC4-6F175D3DCCD1}">
                 <a14:hiddenFill xmlns:a14="http://schemas.microsoft.com/office/drawing/2010/main">
                   <a:solidFill>
                     <a:srgbClr val="FFFFFF"/>
@@ -13712,7 +13733,7 @@
               <a:tailEnd/>
             </a:ln>
             <a:extLst>
-              <a:ext uri="{909E8E84-426E-40DD-AFC4-6F175D3DCCD1}">
+              <a:ext uri="{909E8E84-426E-40dd-AFC4-6F175D3DCCD1}">
                 <a14:hiddenFill xmlns:a14="http://schemas.microsoft.com/office/drawing/2010/main">
                   <a:solidFill>
                     <a:srgbClr val="FFFFFF"/>
@@ -13762,7 +13783,7 @@
               <a:tailEnd type="triangle" w="med" len="med"/>
             </a:ln>
             <a:extLst>
-              <a:ext uri="{909E8E84-426E-40DD-AFC4-6F175D3DCCD1}">
+              <a:ext uri="{909E8E84-426E-40dd-AFC4-6F175D3DCCD1}">
                 <a14:hiddenFill xmlns:a14="http://schemas.microsoft.com/office/drawing/2010/main">
                   <a:noFill/>
                 </a14:hiddenFill>
@@ -13779,7 +13800,7 @@
   <p:timing>
     <p:tnLst>
       <p:par>
-        <p:cTn id="1" dur="indefinite" restart="never" nodeType="tmRoot">
+        <p:cTn xmlns:p14="http://schemas.microsoft.com/office/powerpoint/2010/main" id="1" dur="indefinite" restart="never" nodeType="tmRoot">
           <p:childTnLst>
             <p:seq concurrent="1" nextAc="seek">
               <p:cTn id="2" dur="indefinite" nodeType="mainSeq">
@@ -14056,14 +14077,14 @@
             <a:noFill/>
           </a:ln>
           <a:extLst>
-            <a:ext uri="{909E8E84-426E-40DD-AFC4-6F175D3DCCD1}">
+            <a:ext uri="{909E8E84-426E-40dd-AFC4-6F175D3DCCD1}">
               <a14:hiddenFill xmlns:a14="http://schemas.microsoft.com/office/drawing/2010/main">
                 <a:solidFill>
                   <a:srgbClr val="FFFFFF"/>
                 </a:solidFill>
               </a14:hiddenFill>
             </a:ext>
-            <a:ext uri="{91240B29-F687-4F45-9708-019B960494DF}">
+            <a:ext uri="{91240B29-F687-4f45-9708-019B960494DF}">
               <a14:hiddenLine xmlns:a14="http://schemas.microsoft.com/office/drawing/2010/main" w="9525">
                 <a:solidFill>
                   <a:srgbClr val="000000"/>
@@ -14097,14 +14118,14 @@
             <a:noFill/>
           </a:ln>
           <a:extLst>
-            <a:ext uri="{909E8E84-426E-40DD-AFC4-6F175D3DCCD1}">
+            <a:ext uri="{909E8E84-426E-40dd-AFC4-6F175D3DCCD1}">
               <a14:hiddenFill xmlns:a14="http://schemas.microsoft.com/office/drawing/2010/main">
                 <a:solidFill>
                   <a:srgbClr val="FFFFFF"/>
                 </a:solidFill>
               </a14:hiddenFill>
             </a:ext>
-            <a:ext uri="{91240B29-F687-4F45-9708-019B960494DF}">
+            <a:ext uri="{91240B29-F687-4f45-9708-019B960494DF}">
               <a14:hiddenLine xmlns:a14="http://schemas.microsoft.com/office/drawing/2010/main" w="9525">
                 <a:solidFill>
                   <a:srgbClr val="000000"/>
@@ -14149,7 +14170,7 @@
   <p:timing>
     <p:tnLst>
       <p:par>
-        <p:cTn id="1" dur="indefinite" restart="never" nodeType="tmRoot"/>
+        <p:cTn xmlns:p14="http://schemas.microsoft.com/office/powerpoint/2010/main" id="1" dur="indefinite" restart="never" nodeType="tmRoot"/>
       </p:par>
     </p:tnLst>
   </p:timing>
@@ -14212,11 +14233,7 @@
           <a:p>
             <a:r>
               <a:rPr lang="en-US" dirty="0" smtClean="0"/>
-              <a:t>Blocks </a:t>
-            </a:r>
-            <a:r>
-              <a:rPr lang="en-US" dirty="0" smtClean="0"/>
-              <a:t>execute independently</a:t>
+              <a:t>Blocks execute independently</a:t>
             </a:r>
           </a:p>
           <a:p>
@@ -14250,7 +14267,7 @@
   <p:timing>
     <p:tnLst>
       <p:par>
-        <p:cTn id="1" dur="indefinite" restart="never" nodeType="tmRoot"/>
+        <p:cTn xmlns:p14="http://schemas.microsoft.com/office/powerpoint/2010/main" id="1" dur="indefinite" restart="never" nodeType="tmRoot"/>
       </p:par>
     </p:tnLst>
   </p:timing>
@@ -14330,14 +14347,14 @@
             <a:noFill/>
           </a:ln>
           <a:extLst>
-            <a:ext uri="{909E8E84-426E-40DD-AFC4-6F175D3DCCD1}">
+            <a:ext uri="{909E8E84-426E-40dd-AFC4-6F175D3DCCD1}">
               <a14:hiddenFill xmlns:a14="http://schemas.microsoft.com/office/drawing/2010/main">
                 <a:solidFill>
                   <a:srgbClr val="FFFFFF"/>
                 </a:solidFill>
               </a14:hiddenFill>
             </a:ext>
-            <a:ext uri="{91240B29-F687-4F45-9708-019B960494DF}">
+            <a:ext uri="{91240B29-F687-4f45-9708-019B960494DF}">
               <a14:hiddenLine xmlns:a14="http://schemas.microsoft.com/office/drawing/2010/main" w="9525">
                 <a:solidFill>
                   <a:srgbClr val="000000"/>
@@ -14371,14 +14388,14 @@
             <a:noFill/>
           </a:ln>
           <a:extLst>
-            <a:ext uri="{909E8E84-426E-40DD-AFC4-6F175D3DCCD1}">
+            <a:ext uri="{909E8E84-426E-40dd-AFC4-6F175D3DCCD1}">
               <a14:hiddenFill xmlns:a14="http://schemas.microsoft.com/office/drawing/2010/main">
                 <a:solidFill>
                   <a:srgbClr val="FFFFFF"/>
                 </a:solidFill>
               </a14:hiddenFill>
             </a:ext>
-            <a:ext uri="{91240B29-F687-4F45-9708-019B960494DF}">
+            <a:ext uri="{91240B29-F687-4f45-9708-019B960494DF}">
               <a14:hiddenLine xmlns:a14="http://schemas.microsoft.com/office/drawing/2010/main" w="9525">
                 <a:solidFill>
                   <a:srgbClr val="000000"/>
@@ -14509,7 +14526,7 @@
   <p:timing>
     <p:tnLst>
       <p:par>
-        <p:cTn id="1" dur="indefinite" restart="never" nodeType="tmRoot"/>
+        <p:cTn xmlns:p14="http://schemas.microsoft.com/office/powerpoint/2010/main" id="1" dur="indefinite" restart="never" nodeType="tmRoot"/>
       </p:par>
     </p:tnLst>
   </p:timing>
@@ -14576,14 +14593,14 @@
             <a:noFill/>
           </a:ln>
           <a:extLst>
-            <a:ext uri="{909E8E84-426E-40DD-AFC4-6F175D3DCCD1}">
+            <a:ext uri="{909E8E84-426E-40dd-AFC4-6F175D3DCCD1}">
               <a14:hiddenFill xmlns:a14="http://schemas.microsoft.com/office/drawing/2010/main">
                 <a:solidFill>
                   <a:srgbClr val="FFFFFF"/>
                 </a:solidFill>
               </a14:hiddenFill>
             </a:ext>
-            <a:ext uri="{91240B29-F687-4F45-9708-019B960494DF}">
+            <a:ext uri="{91240B29-F687-4f45-9708-019B960494DF}">
               <a14:hiddenLine xmlns:a14="http://schemas.microsoft.com/office/drawing/2010/main" w="9525">
                 <a:solidFill>
                   <a:srgbClr val="000000"/>
@@ -14740,14 +14757,14 @@
             <a:noFill/>
           </a:ln>
           <a:extLst>
-            <a:ext uri="{909E8E84-426E-40DD-AFC4-6F175D3DCCD1}">
+            <a:ext uri="{909E8E84-426E-40dd-AFC4-6F175D3DCCD1}">
               <a14:hiddenFill xmlns:a14="http://schemas.microsoft.com/office/drawing/2010/main">
                 <a:solidFill>
                   <a:srgbClr val="FFFFFF"/>
                 </a:solidFill>
               </a14:hiddenFill>
             </a:ext>
-            <a:ext uri="{91240B29-F687-4F45-9708-019B960494DF}">
+            <a:ext uri="{91240B29-F687-4f45-9708-019B960494DF}">
               <a14:hiddenLine xmlns:a14="http://schemas.microsoft.com/office/drawing/2010/main" w="9525">
                 <a:solidFill>
                   <a:srgbClr val="000000"/>
@@ -14768,7 +14785,7 @@
   <p:timing>
     <p:tnLst>
       <p:par>
-        <p:cTn id="1" dur="indefinite" restart="never" nodeType="tmRoot"/>
+        <p:cTn xmlns:p14="http://schemas.microsoft.com/office/powerpoint/2010/main" id="1" dur="indefinite" restart="never" nodeType="tmRoot"/>
       </p:par>
     </p:tnLst>
   </p:timing>
@@ -14887,14 +14904,14 @@
             <a:noFill/>
           </a:ln>
           <a:extLst>
-            <a:ext uri="{909E8E84-426E-40DD-AFC4-6F175D3DCCD1}">
+            <a:ext uri="{909E8E84-426E-40dd-AFC4-6F175D3DCCD1}">
               <a14:hiddenFill xmlns:a14="http://schemas.microsoft.com/office/drawing/2010/main">
                 <a:solidFill>
                   <a:srgbClr val="FFFFFF"/>
                 </a:solidFill>
               </a14:hiddenFill>
             </a:ext>
-            <a:ext uri="{91240B29-F687-4F45-9708-019B960494DF}">
+            <a:ext uri="{91240B29-F687-4f45-9708-019B960494DF}">
               <a14:hiddenLine xmlns:a14="http://schemas.microsoft.com/office/drawing/2010/main" w="9525">
                 <a:solidFill>
                   <a:srgbClr val="000000"/>
@@ -15051,14 +15068,14 @@
             <a:noFill/>
           </a:ln>
           <a:extLst>
-            <a:ext uri="{909E8E84-426E-40DD-AFC4-6F175D3DCCD1}">
+            <a:ext uri="{909E8E84-426E-40dd-AFC4-6F175D3DCCD1}">
               <a14:hiddenFill xmlns:a14="http://schemas.microsoft.com/office/drawing/2010/main">
                 <a:solidFill>
                   <a:srgbClr val="FFFFFF"/>
                 </a:solidFill>
               </a14:hiddenFill>
             </a:ext>
-            <a:ext uri="{91240B29-F687-4F45-9708-019B960494DF}">
+            <a:ext uri="{91240B29-F687-4f45-9708-019B960494DF}">
               <a14:hiddenLine xmlns:a14="http://schemas.microsoft.com/office/drawing/2010/main" w="9525">
                 <a:solidFill>
                   <a:srgbClr val="000000"/>
@@ -15097,7 +15114,7 @@
             <a:tailEnd/>
           </a:ln>
           <a:extLst>
-            <a:ext uri="{909E8E84-426E-40DD-AFC4-6F175D3DCCD1}">
+            <a:ext uri="{909E8E84-426E-40dd-AFC4-6F175D3DCCD1}">
               <a14:hiddenFill xmlns:a14="http://schemas.microsoft.com/office/drawing/2010/main">
                 <a:solidFill>
                   <a:srgbClr val="FFFFFF"/>
@@ -15122,7 +15139,7 @@
   <p:timing>
     <p:tnLst>
       <p:par>
-        <p:cTn id="1" dur="indefinite" restart="never" nodeType="tmRoot">
+        <p:cTn xmlns:p14="http://schemas.microsoft.com/office/powerpoint/2010/main" id="1" dur="indefinite" restart="never" nodeType="tmRoot">
           <p:childTnLst>
             <p:seq concurrent="1" nextAc="seek">
               <p:cTn id="2" dur="indefinite" nodeType="mainSeq">
@@ -15318,14 +15335,14 @@
             <a:noFill/>
           </a:ln>
           <a:extLst>
-            <a:ext uri="{909E8E84-426E-40DD-AFC4-6F175D3DCCD1}">
+            <a:ext uri="{909E8E84-426E-40dd-AFC4-6F175D3DCCD1}">
               <a14:hiddenFill xmlns:a14="http://schemas.microsoft.com/office/drawing/2010/main">
                 <a:solidFill>
                   <a:srgbClr val="FFFFFF"/>
                 </a:solidFill>
               </a14:hiddenFill>
             </a:ext>
-            <a:ext uri="{91240B29-F687-4F45-9708-019B960494DF}">
+            <a:ext uri="{91240B29-F687-4f45-9708-019B960494DF}">
               <a14:hiddenLine xmlns:a14="http://schemas.microsoft.com/office/drawing/2010/main" w="9525">
                 <a:solidFill>
                   <a:srgbClr val="000000"/>
@@ -15482,14 +15499,14 @@
             <a:noFill/>
           </a:ln>
           <a:extLst>
-            <a:ext uri="{909E8E84-426E-40DD-AFC4-6F175D3DCCD1}">
+            <a:ext uri="{909E8E84-426E-40dd-AFC4-6F175D3DCCD1}">
               <a14:hiddenFill xmlns:a14="http://schemas.microsoft.com/office/drawing/2010/main">
                 <a:solidFill>
                   <a:srgbClr val="FFFFFF"/>
                 </a:solidFill>
               </a14:hiddenFill>
             </a:ext>
-            <a:ext uri="{91240B29-F687-4F45-9708-019B960494DF}">
+            <a:ext uri="{91240B29-F687-4f45-9708-019B960494DF}">
               <a14:hiddenLine xmlns:a14="http://schemas.microsoft.com/office/drawing/2010/main" w="9525">
                 <a:solidFill>
                   <a:srgbClr val="000000"/>
@@ -15528,7 +15545,7 @@
             <a:tailEnd/>
           </a:ln>
           <a:extLst>
-            <a:ext uri="{909E8E84-426E-40DD-AFC4-6F175D3DCCD1}">
+            <a:ext uri="{909E8E84-426E-40dd-AFC4-6F175D3DCCD1}">
               <a14:hiddenFill xmlns:a14="http://schemas.microsoft.com/office/drawing/2010/main">
                 <a:solidFill>
                   <a:srgbClr val="FFFFFF"/>
@@ -15553,7 +15570,7 @@
   <p:timing>
     <p:tnLst>
       <p:par>
-        <p:cTn id="1" dur="indefinite" restart="never" nodeType="tmRoot"/>
+        <p:cTn xmlns:p14="http://schemas.microsoft.com/office/powerpoint/2010/main" id="1" dur="indefinite" restart="never" nodeType="tmRoot"/>
       </p:par>
     </p:tnLst>
   </p:timing>
@@ -15620,14 +15637,14 @@
             <a:noFill/>
           </a:ln>
           <a:extLst>
-            <a:ext uri="{909E8E84-426E-40DD-AFC4-6F175D3DCCD1}">
+            <a:ext uri="{909E8E84-426E-40dd-AFC4-6F175D3DCCD1}">
               <a14:hiddenFill xmlns:a14="http://schemas.microsoft.com/office/drawing/2010/main">
                 <a:solidFill>
                   <a:srgbClr val="FFFFFF"/>
                 </a:solidFill>
               </a14:hiddenFill>
             </a:ext>
-            <a:ext uri="{91240B29-F687-4F45-9708-019B960494DF}">
+            <a:ext uri="{91240B29-F687-4f45-9708-019B960494DF}">
               <a14:hiddenLine xmlns:a14="http://schemas.microsoft.com/office/drawing/2010/main" w="9525">
                 <a:solidFill>
                   <a:srgbClr val="000000"/>
@@ -15784,14 +15801,14 @@
             <a:noFill/>
           </a:ln>
           <a:extLst>
-            <a:ext uri="{909E8E84-426E-40DD-AFC4-6F175D3DCCD1}">
+            <a:ext uri="{909E8E84-426E-40dd-AFC4-6F175D3DCCD1}">
               <a14:hiddenFill xmlns:a14="http://schemas.microsoft.com/office/drawing/2010/main">
                 <a:solidFill>
                   <a:srgbClr val="FFFFFF"/>
                 </a:solidFill>
               </a14:hiddenFill>
             </a:ext>
-            <a:ext uri="{91240B29-F687-4F45-9708-019B960494DF}">
+            <a:ext uri="{91240B29-F687-4f45-9708-019B960494DF}">
               <a14:hiddenLine xmlns:a14="http://schemas.microsoft.com/office/drawing/2010/main" w="9525">
                 <a:solidFill>
                   <a:srgbClr val="000000"/>
@@ -15812,7 +15829,7 @@
   <p:timing>
     <p:tnLst>
       <p:par>
-        <p:cTn id="1" dur="indefinite" restart="never" nodeType="tmRoot"/>
+        <p:cTn xmlns:p14="http://schemas.microsoft.com/office/powerpoint/2010/main" id="1" dur="indefinite" restart="never" nodeType="tmRoot"/>
       </p:par>
     </p:tnLst>
   </p:timing>
@@ -15879,14 +15896,14 @@
             <a:noFill/>
           </a:ln>
           <a:extLst>
-            <a:ext uri="{909E8E84-426E-40DD-AFC4-6F175D3DCCD1}">
+            <a:ext uri="{909E8E84-426E-40dd-AFC4-6F175D3DCCD1}">
               <a14:hiddenFill xmlns:a14="http://schemas.microsoft.com/office/drawing/2010/main">
                 <a:solidFill>
                   <a:srgbClr val="FFFFFF"/>
                 </a:solidFill>
               </a14:hiddenFill>
             </a:ext>
-            <a:ext uri="{91240B29-F687-4F45-9708-019B960494DF}">
+            <a:ext uri="{91240B29-F687-4f45-9708-019B960494DF}">
               <a14:hiddenLine xmlns:a14="http://schemas.microsoft.com/office/drawing/2010/main" w="9525">
                 <a:solidFill>
                   <a:srgbClr val="000000"/>
@@ -16043,14 +16060,14 @@
             <a:noFill/>
           </a:ln>
           <a:extLst>
-            <a:ext uri="{909E8E84-426E-40DD-AFC4-6F175D3DCCD1}">
+            <a:ext uri="{909E8E84-426E-40dd-AFC4-6F175D3DCCD1}">
               <a14:hiddenFill xmlns:a14="http://schemas.microsoft.com/office/drawing/2010/main">
                 <a:solidFill>
                   <a:srgbClr val="FFFFFF"/>
                 </a:solidFill>
               </a14:hiddenFill>
             </a:ext>
-            <a:ext uri="{91240B29-F687-4F45-9708-019B960494DF}">
+            <a:ext uri="{91240B29-F687-4f45-9708-019B960494DF}">
               <a14:hiddenLine xmlns:a14="http://schemas.microsoft.com/office/drawing/2010/main" w="9525">
                 <a:solidFill>
                   <a:srgbClr val="000000"/>
@@ -16127,7 +16144,7 @@
             <a:tailEnd/>
           </a:ln>
           <a:extLst>
-            <a:ext uri="{909E8E84-426E-40DD-AFC4-6F175D3DCCD1}">
+            <a:ext uri="{909E8E84-426E-40dd-AFC4-6F175D3DCCD1}">
               <a14:hiddenFill xmlns:a14="http://schemas.microsoft.com/office/drawing/2010/main">
                 <a:solidFill>
                   <a:srgbClr val="FFFFFF"/>
@@ -16276,7 +16293,7 @@
             <a:tailEnd type="triangle" w="med" len="med"/>
           </a:ln>
           <a:extLst>
-            <a:ext uri="{909E8E84-426E-40DD-AFC4-6F175D3DCCD1}">
+            <a:ext uri="{909E8E84-426E-40dd-AFC4-6F175D3DCCD1}">
               <a14:hiddenFill xmlns:a14="http://schemas.microsoft.com/office/drawing/2010/main">
                 <a:noFill/>
               </a14:hiddenFill>
@@ -16355,7 +16372,7 @@
             <a:tailEnd/>
           </a:ln>
           <a:extLst>
-            <a:ext uri="{909E8E84-426E-40DD-AFC4-6F175D3DCCD1}">
+            <a:ext uri="{909E8E84-426E-40dd-AFC4-6F175D3DCCD1}">
               <a14:hiddenFill xmlns:a14="http://schemas.microsoft.com/office/drawing/2010/main">
                 <a:solidFill>
                   <a:srgbClr val="FFFFFF"/>
@@ -16504,7 +16521,7 @@
             <a:tailEnd type="triangle" w="med" len="med"/>
           </a:ln>
           <a:extLst>
-            <a:ext uri="{909E8E84-426E-40DD-AFC4-6F175D3DCCD1}">
+            <a:ext uri="{909E8E84-426E-40dd-AFC4-6F175D3DCCD1}">
               <a14:hiddenFill xmlns:a14="http://schemas.microsoft.com/office/drawing/2010/main">
                 <a:noFill/>
               </a14:hiddenFill>
@@ -16527,7 +16544,7 @@
   <p:timing>
     <p:tnLst>
       <p:par>
-        <p:cTn id="1" dur="indefinite" restart="never" nodeType="tmRoot"/>
+        <p:cTn xmlns:p14="http://schemas.microsoft.com/office/powerpoint/2010/main" id="1" dur="indefinite" restart="never" nodeType="tmRoot"/>
       </p:par>
     </p:tnLst>
   </p:timing>
@@ -16635,7 +16652,7 @@
   <p:timing>
     <p:tnLst>
       <p:par>
-        <p:cTn id="1" dur="indefinite" restart="never" nodeType="tmRoot"/>
+        <p:cTn xmlns:p14="http://schemas.microsoft.com/office/powerpoint/2010/main" id="1" dur="indefinite" restart="never" nodeType="tmRoot"/>
       </p:par>
     </p:tnLst>
   </p:timing>
@@ -17030,7 +17047,7 @@
   <p:timing>
     <p:tnLst>
       <p:par>
-        <p:cTn id="1" dur="indefinite" restart="never" nodeType="tmRoot"/>
+        <p:cTn xmlns:p14="http://schemas.microsoft.com/office/powerpoint/2010/main" id="1" dur="indefinite" restart="never" nodeType="tmRoot"/>
       </p:par>
     </p:tnLst>
   </p:timing>
@@ -17486,7 +17503,7 @@
             <a:tailEnd type="arrow" w="med" len="med"/>
           </a:ln>
           <a:extLst>
-            <a:ext uri="{909E8E84-426E-40DD-AFC4-6F175D3DCCD1}">
+            <a:ext uri="{909E8E84-426E-40dd-AFC4-6F175D3DCCD1}">
               <a14:hiddenFill xmlns:a14="http://schemas.microsoft.com/office/drawing/2010/main">
                 <a:noFill/>
               </a14:hiddenFill>
@@ -17502,7 +17519,7 @@
   <p:timing>
     <p:tnLst>
       <p:par>
-        <p:cTn id="1" dur="indefinite" restart="never" nodeType="tmRoot"/>
+        <p:cTn xmlns:p14="http://schemas.microsoft.com/office/powerpoint/2010/main" id="1" dur="indefinite" restart="never" nodeType="tmRoot"/>
       </p:par>
     </p:tnLst>
   </p:timing>
@@ -17955,7 +17972,7 @@
             <a:tailEnd type="arrow" w="med" len="med"/>
           </a:ln>
           <a:extLst>
-            <a:ext uri="{909E8E84-426E-40DD-AFC4-6F175D3DCCD1}">
+            <a:ext uri="{909E8E84-426E-40dd-AFC4-6F175D3DCCD1}">
               <a14:hiddenFill xmlns:a14="http://schemas.microsoft.com/office/drawing/2010/main">
                 <a:noFill/>
               </a14:hiddenFill>
@@ -17971,7 +17988,7 @@
   <p:timing>
     <p:tnLst>
       <p:par>
-        <p:cTn id="1" dur="indefinite" restart="never" nodeType="tmRoot"/>
+        <p:cTn xmlns:p14="http://schemas.microsoft.com/office/powerpoint/2010/main" id="1" dur="indefinite" restart="never" nodeType="tmRoot"/>
       </p:par>
     </p:tnLst>
   </p:timing>
@@ -18424,7 +18441,7 @@
             <a:tailEnd type="arrow" w="med" len="med"/>
           </a:ln>
           <a:extLst>
-            <a:ext uri="{909E8E84-426E-40DD-AFC4-6F175D3DCCD1}">
+            <a:ext uri="{909E8E84-426E-40dd-AFC4-6F175D3DCCD1}">
               <a14:hiddenFill xmlns:a14="http://schemas.microsoft.com/office/drawing/2010/main">
                 <a:noFill/>
               </a14:hiddenFill>
@@ -18440,7 +18457,7 @@
   <p:timing>
     <p:tnLst>
       <p:par>
-        <p:cTn id="1" dur="indefinite" restart="never" nodeType="tmRoot"/>
+        <p:cTn xmlns:p14="http://schemas.microsoft.com/office/powerpoint/2010/main" id="1" dur="indefinite" restart="never" nodeType="tmRoot"/>
       </p:par>
     </p:tnLst>
   </p:timing>
@@ -18896,7 +18913,7 @@
             <a:tailEnd type="arrow" w="med" len="med"/>
           </a:ln>
           <a:extLst>
-            <a:ext uri="{909E8E84-426E-40DD-AFC4-6F175D3DCCD1}">
+            <a:ext uri="{909E8E84-426E-40dd-AFC4-6F175D3DCCD1}">
               <a14:hiddenFill xmlns:a14="http://schemas.microsoft.com/office/drawing/2010/main">
                 <a:noFill/>
               </a14:hiddenFill>
@@ -18912,7 +18929,7 @@
   <p:timing>
     <p:tnLst>
       <p:par>
-        <p:cTn id="1" dur="indefinite" restart="never" nodeType="tmRoot"/>
+        <p:cTn xmlns:p14="http://schemas.microsoft.com/office/powerpoint/2010/main" id="1" dur="indefinite" restart="never" nodeType="tmRoot"/>
       </p:par>
     </p:tnLst>
   </p:timing>
@@ -18970,14 +18987,14 @@
             <a:noFill/>
           </a:ln>
           <a:extLst>
-            <a:ext uri="{909E8E84-426E-40DD-AFC4-6F175D3DCCD1}">
+            <a:ext uri="{909E8E84-426E-40dd-AFC4-6F175D3DCCD1}">
               <a14:hiddenFill xmlns:a14="http://schemas.microsoft.com/office/drawing/2010/main">
                 <a:solidFill>
                   <a:srgbClr val="FFFFFF"/>
                 </a:solidFill>
               </a14:hiddenFill>
             </a:ext>
-            <a:ext uri="{91240B29-F687-4F45-9708-019B960494DF}">
+            <a:ext uri="{91240B29-F687-4f45-9708-019B960494DF}">
               <a14:hiddenLine xmlns:a14="http://schemas.microsoft.com/office/drawing/2010/main" w="9525">
                 <a:solidFill>
                   <a:srgbClr val="000000"/>
@@ -19033,14 +19050,14 @@
             <a:noFill/>
           </a:ln>
           <a:extLst>
-            <a:ext uri="{909E8E84-426E-40DD-AFC4-6F175D3DCCD1}">
+            <a:ext uri="{909E8E84-426E-40dd-AFC4-6F175D3DCCD1}">
               <a14:hiddenFill xmlns:a14="http://schemas.microsoft.com/office/drawing/2010/main">
                 <a:solidFill>
                   <a:srgbClr val="FFFFFF"/>
                 </a:solidFill>
               </a14:hiddenFill>
             </a:ext>
-            <a:ext uri="{91240B29-F687-4F45-9708-019B960494DF}">
+            <a:ext uri="{91240B29-F687-4f45-9708-019B960494DF}">
               <a14:hiddenLine xmlns:a14="http://schemas.microsoft.com/office/drawing/2010/main" w="9525">
                 <a:solidFill>
                   <a:srgbClr val="000000"/>
@@ -19490,7 +19507,7 @@
             <a:tailEnd type="arrow" w="med" len="med"/>
           </a:ln>
           <a:extLst>
-            <a:ext uri="{909E8E84-426E-40DD-AFC4-6F175D3DCCD1}">
+            <a:ext uri="{909E8E84-426E-40dd-AFC4-6F175D3DCCD1}">
               <a14:hiddenFill xmlns:a14="http://schemas.microsoft.com/office/drawing/2010/main">
                 <a:noFill/>
               </a14:hiddenFill>
@@ -19524,7 +19541,7 @@
             <a:tailEnd/>
           </a:ln>
           <a:extLst>
-            <a:ext uri="{909E8E84-426E-40DD-AFC4-6F175D3DCCD1}">
+            <a:ext uri="{909E8E84-426E-40dd-AFC4-6F175D3DCCD1}">
               <a14:hiddenFill xmlns:a14="http://schemas.microsoft.com/office/drawing/2010/main">
                 <a:solidFill>
                   <a:srgbClr val="FFFFFF"/>
@@ -19673,7 +19690,7 @@
             <a:tailEnd type="triangle" w="med" len="med"/>
           </a:ln>
           <a:extLst>
-            <a:ext uri="{909E8E84-426E-40DD-AFC4-6F175D3DCCD1}">
+            <a:ext uri="{909E8E84-426E-40dd-AFC4-6F175D3DCCD1}">
               <a14:hiddenFill xmlns:a14="http://schemas.microsoft.com/office/drawing/2010/main">
                 <a:noFill/>
               </a14:hiddenFill>
@@ -19752,7 +19769,7 @@
             <a:tailEnd/>
           </a:ln>
           <a:extLst>
-            <a:ext uri="{909E8E84-426E-40DD-AFC4-6F175D3DCCD1}">
+            <a:ext uri="{909E8E84-426E-40dd-AFC4-6F175D3DCCD1}">
               <a14:hiddenFill xmlns:a14="http://schemas.microsoft.com/office/drawing/2010/main">
                 <a:solidFill>
                   <a:srgbClr val="FFFFFF"/>
@@ -19901,7 +19918,7 @@
             <a:tailEnd type="triangle" w="med" len="med"/>
           </a:ln>
           <a:extLst>
-            <a:ext uri="{909E8E84-426E-40DD-AFC4-6F175D3DCCD1}">
+            <a:ext uri="{909E8E84-426E-40dd-AFC4-6F175D3DCCD1}">
               <a14:hiddenFill xmlns:a14="http://schemas.microsoft.com/office/drawing/2010/main">
                 <a:noFill/>
               </a14:hiddenFill>
@@ -19980,7 +19997,7 @@
             <a:tailEnd/>
           </a:ln>
           <a:extLst>
-            <a:ext uri="{909E8E84-426E-40DD-AFC4-6F175D3DCCD1}">
+            <a:ext uri="{909E8E84-426E-40dd-AFC4-6F175D3DCCD1}">
               <a14:hiddenFill xmlns:a14="http://schemas.microsoft.com/office/drawing/2010/main">
                 <a:solidFill>
                   <a:srgbClr val="FFFFFF"/>
@@ -20129,7 +20146,7 @@
             <a:tailEnd type="triangle" w="med" len="med"/>
           </a:ln>
           <a:extLst>
-            <a:ext uri="{909E8E84-426E-40DD-AFC4-6F175D3DCCD1}">
+            <a:ext uri="{909E8E84-426E-40dd-AFC4-6F175D3DCCD1}">
               <a14:hiddenFill xmlns:a14="http://schemas.microsoft.com/office/drawing/2010/main">
                 <a:noFill/>
               </a14:hiddenFill>
@@ -20152,7 +20169,7 @@
   <p:timing>
     <p:tnLst>
       <p:par>
-        <p:cTn id="1" dur="indefinite" restart="never" nodeType="tmRoot"/>
+        <p:cTn xmlns:p14="http://schemas.microsoft.com/office/powerpoint/2010/main" id="1" dur="indefinite" restart="never" nodeType="tmRoot"/>
       </p:par>
     </p:tnLst>
   </p:timing>
@@ -20210,14 +20227,14 @@
             <a:noFill/>
           </a:ln>
           <a:extLst>
-            <a:ext uri="{909E8E84-426E-40DD-AFC4-6F175D3DCCD1}">
+            <a:ext uri="{909E8E84-426E-40dd-AFC4-6F175D3DCCD1}">
               <a14:hiddenFill xmlns:a14="http://schemas.microsoft.com/office/drawing/2010/main">
                 <a:solidFill>
                   <a:srgbClr val="FFFFFF"/>
                 </a:solidFill>
               </a14:hiddenFill>
             </a:ext>
-            <a:ext uri="{91240B29-F687-4F45-9708-019B960494DF}">
+            <a:ext uri="{91240B29-F687-4f45-9708-019B960494DF}">
               <a14:hiddenLine xmlns:a14="http://schemas.microsoft.com/office/drawing/2010/main" w="9525">
                 <a:solidFill>
                   <a:srgbClr val="000000"/>
@@ -20273,14 +20290,14 @@
             <a:noFill/>
           </a:ln>
           <a:extLst>
-            <a:ext uri="{909E8E84-426E-40DD-AFC4-6F175D3DCCD1}">
+            <a:ext uri="{909E8E84-426E-40dd-AFC4-6F175D3DCCD1}">
               <a14:hiddenFill xmlns:a14="http://schemas.microsoft.com/office/drawing/2010/main">
                 <a:solidFill>
                   <a:srgbClr val="FFFFFF"/>
                 </a:solidFill>
               </a14:hiddenFill>
             </a:ext>
-            <a:ext uri="{91240B29-F687-4F45-9708-019B960494DF}">
+            <a:ext uri="{91240B29-F687-4f45-9708-019B960494DF}">
               <a14:hiddenLine xmlns:a14="http://schemas.microsoft.com/office/drawing/2010/main" w="9525">
                 <a:solidFill>
                   <a:srgbClr val="000000"/>
@@ -20730,7 +20747,7 @@
             <a:tailEnd type="arrow" w="med" len="med"/>
           </a:ln>
           <a:extLst>
-            <a:ext uri="{909E8E84-426E-40DD-AFC4-6F175D3DCCD1}">
+            <a:ext uri="{909E8E84-426E-40dd-AFC4-6F175D3DCCD1}">
               <a14:hiddenFill xmlns:a14="http://schemas.microsoft.com/office/drawing/2010/main">
                 <a:noFill/>
               </a14:hiddenFill>
@@ -20746,7 +20763,7 @@
   <p:timing>
     <p:tnLst>
       <p:par>
-        <p:cTn id="1" dur="indefinite" restart="never" nodeType="tmRoot"/>
+        <p:cTn xmlns:p14="http://schemas.microsoft.com/office/powerpoint/2010/main" id="1" dur="indefinite" restart="never" nodeType="tmRoot"/>
       </p:par>
     </p:tnLst>
   </p:timing>
@@ -20918,14 +20935,14 @@
             <a:noFill/>
           </a:ln>
           <a:extLst>
-            <a:ext uri="{909E8E84-426E-40DD-AFC4-6F175D3DCCD1}">
+            <a:ext uri="{909E8E84-426E-40dd-AFC4-6F175D3DCCD1}">
               <a14:hiddenFill xmlns:a14="http://schemas.microsoft.com/office/drawing/2010/main">
                 <a:solidFill>
                   <a:srgbClr val="FFFFFF"/>
                 </a:solidFill>
               </a14:hiddenFill>
             </a:ext>
-            <a:ext uri="{91240B29-F687-4F45-9708-019B960494DF}">
+            <a:ext uri="{91240B29-F687-4f45-9708-019B960494DF}">
               <a14:hiddenLine xmlns:a14="http://schemas.microsoft.com/office/drawing/2010/main" w="9525">
                 <a:solidFill>
                   <a:srgbClr val="000000"/>
@@ -20959,14 +20976,14 @@
             <a:noFill/>
           </a:ln>
           <a:extLst>
-            <a:ext uri="{909E8E84-426E-40DD-AFC4-6F175D3DCCD1}">
+            <a:ext uri="{909E8E84-426E-40dd-AFC4-6F175D3DCCD1}">
               <a14:hiddenFill xmlns:a14="http://schemas.microsoft.com/office/drawing/2010/main">
                 <a:solidFill>
                   <a:srgbClr val="FFFFFF"/>
                 </a:solidFill>
               </a14:hiddenFill>
             </a:ext>
-            <a:ext uri="{91240B29-F687-4F45-9708-019B960494DF}">
+            <a:ext uri="{91240B29-F687-4f45-9708-019B960494DF}">
               <a14:hiddenLine xmlns:a14="http://schemas.microsoft.com/office/drawing/2010/main" w="9525">
                 <a:solidFill>
                   <a:srgbClr val="000000"/>
@@ -21164,7 +21181,7 @@
   <p:timing>
     <p:tnLst>
       <p:par>
-        <p:cTn id="1" dur="indefinite" restart="never" nodeType="tmRoot"/>
+        <p:cTn xmlns:p14="http://schemas.microsoft.com/office/powerpoint/2010/main" id="1" dur="indefinite" restart="never" nodeType="tmRoot"/>
       </p:par>
     </p:tnLst>
   </p:timing>
@@ -21324,7 +21341,7 @@
   <p:timing>
     <p:tnLst>
       <p:par>
-        <p:cTn id="1" dur="indefinite" restart="never" nodeType="tmRoot">
+        <p:cTn xmlns:p14="http://schemas.microsoft.com/office/powerpoint/2010/main" id="1" dur="indefinite" restart="never" nodeType="tmRoot">
           <p:childTnLst>
             <p:seq concurrent="1" nextAc="seek">
               <p:cTn id="2" dur="indefinite" nodeType="mainSeq">
@@ -21574,7 +21591,7 @@
   <p:timing>
     <p:tnLst>
       <p:par>
-        <p:cTn id="1" dur="indefinite" restart="never" nodeType="tmRoot"/>
+        <p:cTn xmlns:p14="http://schemas.microsoft.com/office/powerpoint/2010/main" id="1" dur="indefinite" restart="never" nodeType="tmRoot"/>
       </p:par>
     </p:tnLst>
   </p:timing>
@@ -21641,14 +21658,14 @@
             <a:noFill/>
           </a:ln>
           <a:extLst>
-            <a:ext uri="{909E8E84-426E-40DD-AFC4-6F175D3DCCD1}">
+            <a:ext uri="{909E8E84-426E-40dd-AFC4-6F175D3DCCD1}">
               <a14:hiddenFill xmlns:a14="http://schemas.microsoft.com/office/drawing/2010/main">
                 <a:solidFill>
                   <a:srgbClr val="FFFFFF"/>
                 </a:solidFill>
               </a14:hiddenFill>
             </a:ext>
-            <a:ext uri="{91240B29-F687-4F45-9708-019B960494DF}">
+            <a:ext uri="{91240B29-F687-4f45-9708-019B960494DF}">
               <a14:hiddenLine xmlns:a14="http://schemas.microsoft.com/office/drawing/2010/main" w="9525">
                 <a:solidFill>
                   <a:srgbClr val="000000"/>
@@ -21940,7 +21957,7 @@
               <a:t> width)</a:t>
             </a:r>
             <a:r>
-              <a:rPr lang="ar-SA" dirty="0">
+              <a:rPr lang="x-none" dirty="0">
                 <a:solidFill>
                   <a:srgbClr val="000000"/>
                 </a:solidFill>
@@ -22073,7 +22090,7 @@
               <a:t> i = 0; i &lt; width; ++i)</a:t>
             </a:r>
             <a:r>
-              <a:rPr lang="ar-SA" dirty="0">
+              <a:rPr lang="x-none" dirty="0">
                 <a:solidFill>
                   <a:srgbClr val="000000"/>
                 </a:solidFill>
@@ -22759,14 +22776,14 @@
             <a:noFill/>
           </a:ln>
           <a:extLst>
-            <a:ext uri="{909E8E84-426E-40DD-AFC4-6F175D3DCCD1}">
+            <a:ext uri="{909E8E84-426E-40dd-AFC4-6F175D3DCCD1}">
               <a14:hiddenFill xmlns:a14="http://schemas.microsoft.com/office/drawing/2010/main">
                 <a:solidFill>
                   <a:srgbClr val="FFFFFF"/>
                 </a:solidFill>
               </a14:hiddenFill>
             </a:ext>
-            <a:ext uri="{91240B29-F687-4F45-9708-019B960494DF}">
+            <a:ext uri="{91240B29-F687-4f45-9708-019B960494DF}">
               <a14:hiddenLine xmlns:a14="http://schemas.microsoft.com/office/drawing/2010/main" w="9525">
                 <a:solidFill>
                   <a:srgbClr val="000000"/>
@@ -22787,7 +22804,7 @@
   <p:timing>
     <p:tnLst>
       <p:par>
-        <p:cTn id="1" dur="indefinite" restart="never" nodeType="tmRoot"/>
+        <p:cTn xmlns:p14="http://schemas.microsoft.com/office/powerpoint/2010/main" id="1" dur="indefinite" restart="never" nodeType="tmRoot"/>
       </p:par>
     </p:tnLst>
   </p:timing>
@@ -22854,14 +22871,14 @@
             <a:noFill/>
           </a:ln>
           <a:extLst>
-            <a:ext uri="{909E8E84-426E-40DD-AFC4-6F175D3DCCD1}">
+            <a:ext uri="{909E8E84-426E-40dd-AFC4-6F175D3DCCD1}">
               <a14:hiddenFill xmlns:a14="http://schemas.microsoft.com/office/drawing/2010/main">
                 <a:solidFill>
                   <a:srgbClr val="FFFFFF"/>
                 </a:solidFill>
               </a14:hiddenFill>
             </a:ext>
-            <a:ext uri="{91240B29-F687-4F45-9708-019B960494DF}">
+            <a:ext uri="{91240B29-F687-4f45-9708-019B960494DF}">
               <a14:hiddenLine xmlns:a14="http://schemas.microsoft.com/office/drawing/2010/main" w="9525">
                 <a:solidFill>
                   <a:srgbClr val="000000"/>
@@ -23018,14 +23035,14 @@
             <a:noFill/>
           </a:ln>
           <a:extLst>
-            <a:ext uri="{909E8E84-426E-40DD-AFC4-6F175D3DCCD1}">
+            <a:ext uri="{909E8E84-426E-40dd-AFC4-6F175D3DCCD1}">
               <a14:hiddenFill xmlns:a14="http://schemas.microsoft.com/office/drawing/2010/main">
                 <a:solidFill>
                   <a:srgbClr val="FFFFFF"/>
                 </a:solidFill>
               </a14:hiddenFill>
             </a:ext>
-            <a:ext uri="{91240B29-F687-4F45-9708-019B960494DF}">
+            <a:ext uri="{91240B29-F687-4f45-9708-019B960494DF}">
               <a14:hiddenLine xmlns:a14="http://schemas.microsoft.com/office/drawing/2010/main" w="9525">
                 <a:solidFill>
                   <a:srgbClr val="000000"/>
@@ -23084,7 +23101,7 @@
   <p:timing>
     <p:tnLst>
       <p:par>
-        <p:cTn id="1" dur="indefinite" restart="never" nodeType="tmRoot"/>
+        <p:cTn xmlns:p14="http://schemas.microsoft.com/office/powerpoint/2010/main" id="1" dur="indefinite" restart="never" nodeType="tmRoot"/>
       </p:par>
     </p:tnLst>
   </p:timing>
@@ -23151,14 +23168,14 @@
             <a:noFill/>
           </a:ln>
           <a:extLst>
-            <a:ext uri="{909E8E84-426E-40DD-AFC4-6F175D3DCCD1}">
+            <a:ext uri="{909E8E84-426E-40dd-AFC4-6F175D3DCCD1}">
               <a14:hiddenFill xmlns:a14="http://schemas.microsoft.com/office/drawing/2010/main">
                 <a:solidFill>
                   <a:srgbClr val="FFFFFF"/>
                 </a:solidFill>
               </a14:hiddenFill>
             </a:ext>
-            <a:ext uri="{91240B29-F687-4F45-9708-019B960494DF}">
+            <a:ext uri="{91240B29-F687-4f45-9708-019B960494DF}">
               <a14:hiddenLine xmlns:a14="http://schemas.microsoft.com/office/drawing/2010/main" w="9525">
                 <a:solidFill>
                   <a:srgbClr val="000000"/>
@@ -23315,14 +23332,14 @@
             <a:noFill/>
           </a:ln>
           <a:extLst>
-            <a:ext uri="{909E8E84-426E-40DD-AFC4-6F175D3DCCD1}">
+            <a:ext uri="{909E8E84-426E-40dd-AFC4-6F175D3DCCD1}">
               <a14:hiddenFill xmlns:a14="http://schemas.microsoft.com/office/drawing/2010/main">
                 <a:solidFill>
                   <a:srgbClr val="FFFFFF"/>
                 </a:solidFill>
               </a14:hiddenFill>
             </a:ext>
-            <a:ext uri="{91240B29-F687-4F45-9708-019B960494DF}">
+            <a:ext uri="{91240B29-F687-4f45-9708-019B960494DF}">
               <a14:hiddenLine xmlns:a14="http://schemas.microsoft.com/office/drawing/2010/main" w="9525">
                 <a:solidFill>
                   <a:srgbClr val="000000"/>
@@ -23381,7 +23398,7 @@
   <p:timing>
     <p:tnLst>
       <p:par>
-        <p:cTn id="1" dur="indefinite" restart="never" nodeType="tmRoot"/>
+        <p:cTn xmlns:p14="http://schemas.microsoft.com/office/powerpoint/2010/main" id="1" dur="indefinite" restart="never" nodeType="tmRoot"/>
       </p:par>
     </p:tnLst>
   </p:timing>
@@ -23448,14 +23465,14 @@
             <a:noFill/>
           </a:ln>
           <a:extLst>
-            <a:ext uri="{909E8E84-426E-40DD-AFC4-6F175D3DCCD1}">
+            <a:ext uri="{909E8E84-426E-40dd-AFC4-6F175D3DCCD1}">
               <a14:hiddenFill xmlns:a14="http://schemas.microsoft.com/office/drawing/2010/main">
                 <a:solidFill>
                   <a:srgbClr val="FFFFFF"/>
                 </a:solidFill>
               </a14:hiddenFill>
             </a:ext>
-            <a:ext uri="{91240B29-F687-4F45-9708-019B960494DF}">
+            <a:ext uri="{91240B29-F687-4f45-9708-019B960494DF}">
               <a14:hiddenLine xmlns:a14="http://schemas.microsoft.com/office/drawing/2010/main" w="9525">
                 <a:solidFill>
                   <a:srgbClr val="000000"/>
@@ -23612,14 +23629,14 @@
             <a:noFill/>
           </a:ln>
           <a:extLst>
-            <a:ext uri="{909E8E84-426E-40DD-AFC4-6F175D3DCCD1}">
+            <a:ext uri="{909E8E84-426E-40dd-AFC4-6F175D3DCCD1}">
               <a14:hiddenFill xmlns:a14="http://schemas.microsoft.com/office/drawing/2010/main">
                 <a:solidFill>
                   <a:srgbClr val="FFFFFF"/>
                 </a:solidFill>
               </a14:hiddenFill>
             </a:ext>
-            <a:ext uri="{91240B29-F687-4F45-9708-019B960494DF}">
+            <a:ext uri="{91240B29-F687-4f45-9708-019B960494DF}">
               <a14:hiddenLine xmlns:a14="http://schemas.microsoft.com/office/drawing/2010/main" w="9525">
                 <a:solidFill>
                   <a:srgbClr val="000000"/>
@@ -23678,7 +23695,7 @@
   <p:timing>
     <p:tnLst>
       <p:par>
-        <p:cTn id="1" dur="indefinite" restart="never" nodeType="tmRoot"/>
+        <p:cTn xmlns:p14="http://schemas.microsoft.com/office/powerpoint/2010/main" id="1" dur="indefinite" restart="never" nodeType="tmRoot"/>
       </p:par>
     </p:tnLst>
   </p:timing>
@@ -23782,7 +23799,7 @@
   <p:timing>
     <p:tnLst>
       <p:par>
-        <p:cTn id="1" dur="indefinite" restart="never" nodeType="tmRoot"/>
+        <p:cTn xmlns:p14="http://schemas.microsoft.com/office/powerpoint/2010/main" id="1" dur="indefinite" restart="never" nodeType="tmRoot"/>
       </p:par>
     </p:tnLst>
   </p:timing>
@@ -23849,14 +23866,14 @@
             <a:noFill/>
           </a:ln>
           <a:extLst>
-            <a:ext uri="{909E8E84-426E-40DD-AFC4-6F175D3DCCD1}">
+            <a:ext uri="{909E8E84-426E-40dd-AFC4-6F175D3DCCD1}">
               <a14:hiddenFill xmlns:a14="http://schemas.microsoft.com/office/drawing/2010/main">
                 <a:solidFill>
                   <a:srgbClr val="FFFFFF"/>
                 </a:solidFill>
               </a14:hiddenFill>
             </a:ext>
-            <a:ext uri="{91240B29-F687-4F45-9708-019B960494DF}">
+            <a:ext uri="{91240B29-F687-4f45-9708-019B960494DF}">
               <a14:hiddenLine xmlns:a14="http://schemas.microsoft.com/office/drawing/2010/main" w="9525">
                 <a:solidFill>
                   <a:srgbClr val="000000"/>
@@ -24013,14 +24030,14 @@
             <a:noFill/>
           </a:ln>
           <a:extLst>
-            <a:ext uri="{909E8E84-426E-40DD-AFC4-6F175D3DCCD1}">
+            <a:ext uri="{909E8E84-426E-40dd-AFC4-6F175D3DCCD1}">
               <a14:hiddenFill xmlns:a14="http://schemas.microsoft.com/office/drawing/2010/main">
                 <a:solidFill>
                   <a:srgbClr val="FFFFFF"/>
                 </a:solidFill>
               </a14:hiddenFill>
             </a:ext>
-            <a:ext uri="{91240B29-F687-4F45-9708-019B960494DF}">
+            <a:ext uri="{91240B29-F687-4f45-9708-019B960494DF}">
               <a14:hiddenLine xmlns:a14="http://schemas.microsoft.com/office/drawing/2010/main" w="9525">
                 <a:solidFill>
                   <a:srgbClr val="000000"/>
@@ -24097,7 +24114,7 @@
             <a:tailEnd/>
           </a:ln>
           <a:extLst>
-            <a:ext uri="{909E8E84-426E-40DD-AFC4-6F175D3DCCD1}">
+            <a:ext uri="{909E8E84-426E-40dd-AFC4-6F175D3DCCD1}">
               <a14:hiddenFill xmlns:a14="http://schemas.microsoft.com/office/drawing/2010/main">
                 <a:solidFill>
                   <a:srgbClr val="FFFFFF"/>
@@ -24246,7 +24263,7 @@
             <a:tailEnd type="triangle" w="med" len="med"/>
           </a:ln>
           <a:extLst>
-            <a:ext uri="{909E8E84-426E-40DD-AFC4-6F175D3DCCD1}">
+            <a:ext uri="{909E8E84-426E-40dd-AFC4-6F175D3DCCD1}">
               <a14:hiddenFill xmlns:a14="http://schemas.microsoft.com/office/drawing/2010/main">
                 <a:noFill/>
               </a14:hiddenFill>
@@ -24269,7 +24286,7 @@
   <p:timing>
     <p:tnLst>
       <p:par>
-        <p:cTn id="1" dur="indefinite" restart="never" nodeType="tmRoot"/>
+        <p:cTn xmlns:p14="http://schemas.microsoft.com/office/powerpoint/2010/main" id="1" dur="indefinite" restart="never" nodeType="tmRoot"/>
       </p:par>
     </p:tnLst>
   </p:timing>
@@ -24336,14 +24353,14 @@
             <a:noFill/>
           </a:ln>
           <a:extLst>
-            <a:ext uri="{909E8E84-426E-40DD-AFC4-6F175D3DCCD1}">
+            <a:ext uri="{909E8E84-426E-40dd-AFC4-6F175D3DCCD1}">
               <a14:hiddenFill xmlns:a14="http://schemas.microsoft.com/office/drawing/2010/main">
                 <a:solidFill>
                   <a:srgbClr val="FFFFFF"/>
                 </a:solidFill>
               </a14:hiddenFill>
             </a:ext>
-            <a:ext uri="{91240B29-F687-4F45-9708-019B960494DF}">
+            <a:ext uri="{91240B29-F687-4f45-9708-019B960494DF}">
               <a14:hiddenLine xmlns:a14="http://schemas.microsoft.com/office/drawing/2010/main" w="9525">
                 <a:solidFill>
                   <a:srgbClr val="000000"/>
@@ -24500,14 +24517,14 @@
             <a:noFill/>
           </a:ln>
           <a:extLst>
-            <a:ext uri="{909E8E84-426E-40DD-AFC4-6F175D3DCCD1}">
+            <a:ext uri="{909E8E84-426E-40dd-AFC4-6F175D3DCCD1}">
               <a14:hiddenFill xmlns:a14="http://schemas.microsoft.com/office/drawing/2010/main">
                 <a:solidFill>
                   <a:srgbClr val="FFFFFF"/>
                 </a:solidFill>
               </a14:hiddenFill>
             </a:ext>
-            <a:ext uri="{91240B29-F687-4F45-9708-019B960494DF}">
+            <a:ext uri="{91240B29-F687-4f45-9708-019B960494DF}">
               <a14:hiddenLine xmlns:a14="http://schemas.microsoft.com/office/drawing/2010/main" w="9525">
                 <a:solidFill>
                   <a:srgbClr val="000000"/>
@@ -24584,7 +24601,7 @@
             <a:tailEnd/>
           </a:ln>
           <a:extLst>
-            <a:ext uri="{909E8E84-426E-40DD-AFC4-6F175D3DCCD1}">
+            <a:ext uri="{909E8E84-426E-40dd-AFC4-6F175D3DCCD1}">
               <a14:hiddenFill xmlns:a14="http://schemas.microsoft.com/office/drawing/2010/main">
                 <a:solidFill>
                   <a:srgbClr val="FFFFFF"/>
@@ -24733,7 +24750,7 @@
             <a:tailEnd type="triangle" w="med" len="med"/>
           </a:ln>
           <a:extLst>
-            <a:ext uri="{909E8E84-426E-40DD-AFC4-6F175D3DCCD1}">
+            <a:ext uri="{909E8E84-426E-40dd-AFC4-6F175D3DCCD1}">
               <a14:hiddenFill xmlns:a14="http://schemas.microsoft.com/office/drawing/2010/main">
                 <a:noFill/>
               </a14:hiddenFill>
@@ -24756,7 +24773,7 @@
   <p:timing>
     <p:tnLst>
       <p:par>
-        <p:cTn id="1" dur="indefinite" restart="never" nodeType="tmRoot"/>
+        <p:cTn xmlns:p14="http://schemas.microsoft.com/office/powerpoint/2010/main" id="1" dur="indefinite" restart="never" nodeType="tmRoot"/>
       </p:par>
     </p:tnLst>
   </p:timing>
@@ -24823,14 +24840,14 @@
             <a:noFill/>
           </a:ln>
           <a:extLst>
-            <a:ext uri="{909E8E84-426E-40DD-AFC4-6F175D3DCCD1}">
+            <a:ext uri="{909E8E84-426E-40dd-AFC4-6F175D3DCCD1}">
               <a14:hiddenFill xmlns:a14="http://schemas.microsoft.com/office/drawing/2010/main">
                 <a:solidFill>
                   <a:srgbClr val="FFFFFF"/>
                 </a:solidFill>
               </a14:hiddenFill>
             </a:ext>
-            <a:ext uri="{91240B29-F687-4F45-9708-019B960494DF}">
+            <a:ext uri="{91240B29-F687-4f45-9708-019B960494DF}">
               <a14:hiddenLine xmlns:a14="http://schemas.microsoft.com/office/drawing/2010/main" w="9525">
                 <a:solidFill>
                   <a:srgbClr val="000000"/>
@@ -24987,14 +25004,14 @@
             <a:noFill/>
           </a:ln>
           <a:extLst>
-            <a:ext uri="{909E8E84-426E-40DD-AFC4-6F175D3DCCD1}">
+            <a:ext uri="{909E8E84-426E-40dd-AFC4-6F175D3DCCD1}">
               <a14:hiddenFill xmlns:a14="http://schemas.microsoft.com/office/drawing/2010/main">
                 <a:solidFill>
                   <a:srgbClr val="FFFFFF"/>
                 </a:solidFill>
               </a14:hiddenFill>
             </a:ext>
-            <a:ext uri="{91240B29-F687-4F45-9708-019B960494DF}">
+            <a:ext uri="{91240B29-F687-4f45-9708-019B960494DF}">
               <a14:hiddenLine xmlns:a14="http://schemas.microsoft.com/office/drawing/2010/main" w="9525">
                 <a:solidFill>
                   <a:srgbClr val="000000"/>
@@ -25053,7 +25070,7 @@
   <p:timing>
     <p:tnLst>
       <p:par>
-        <p:cTn id="1" dur="indefinite" restart="never" nodeType="tmRoot"/>
+        <p:cTn xmlns:p14="http://schemas.microsoft.com/office/powerpoint/2010/main" id="1" dur="indefinite" restart="never" nodeType="tmRoot"/>
       </p:par>
     </p:tnLst>
   </p:timing>
@@ -25120,14 +25137,14 @@
             <a:noFill/>
           </a:ln>
           <a:extLst>
-            <a:ext uri="{909E8E84-426E-40DD-AFC4-6F175D3DCCD1}">
+            <a:ext uri="{909E8E84-426E-40dd-AFC4-6F175D3DCCD1}">
               <a14:hiddenFill xmlns:a14="http://schemas.microsoft.com/office/drawing/2010/main">
                 <a:solidFill>
                   <a:srgbClr val="FFFFFF"/>
                 </a:solidFill>
               </a14:hiddenFill>
             </a:ext>
-            <a:ext uri="{91240B29-F687-4F45-9708-019B960494DF}">
+            <a:ext uri="{91240B29-F687-4f45-9708-019B960494DF}">
               <a14:hiddenLine xmlns:a14="http://schemas.microsoft.com/office/drawing/2010/main" w="9525">
                 <a:solidFill>
                   <a:srgbClr val="000000"/>
@@ -25284,14 +25301,14 @@
             <a:noFill/>
           </a:ln>
           <a:extLst>
-            <a:ext uri="{909E8E84-426E-40DD-AFC4-6F175D3DCCD1}">
+            <a:ext uri="{909E8E84-426E-40dd-AFC4-6F175D3DCCD1}">
               <a14:hiddenFill xmlns:a14="http://schemas.microsoft.com/office/drawing/2010/main">
                 <a:solidFill>
                   <a:srgbClr val="FFFFFF"/>
                 </a:solidFill>
               </a14:hiddenFill>
             </a:ext>
-            <a:ext uri="{91240B29-F687-4F45-9708-019B960494DF}">
+            <a:ext uri="{91240B29-F687-4f45-9708-019B960494DF}">
               <a14:hiddenLine xmlns:a14="http://schemas.microsoft.com/office/drawing/2010/main" w="9525">
                 <a:solidFill>
                   <a:srgbClr val="000000"/>
@@ -25368,7 +25385,7 @@
             <a:tailEnd/>
           </a:ln>
           <a:extLst>
-            <a:ext uri="{909E8E84-426E-40DD-AFC4-6F175D3DCCD1}">
+            <a:ext uri="{909E8E84-426E-40dd-AFC4-6F175D3DCCD1}">
               <a14:hiddenFill xmlns:a14="http://schemas.microsoft.com/office/drawing/2010/main">
                 <a:solidFill>
                   <a:srgbClr val="FFFFFF"/>
@@ -25517,7 +25534,7 @@
             <a:tailEnd type="triangle" w="med" len="med"/>
           </a:ln>
           <a:extLst>
-            <a:ext uri="{909E8E84-426E-40DD-AFC4-6F175D3DCCD1}">
+            <a:ext uri="{909E8E84-426E-40dd-AFC4-6F175D3DCCD1}">
               <a14:hiddenFill xmlns:a14="http://schemas.microsoft.com/office/drawing/2010/main">
                 <a:noFill/>
               </a14:hiddenFill>
@@ -25540,7 +25557,7 @@
   <p:timing>
     <p:tnLst>
       <p:par>
-        <p:cTn id="1" dur="indefinite" restart="never" nodeType="tmRoot"/>
+        <p:cTn xmlns:p14="http://schemas.microsoft.com/office/powerpoint/2010/main" id="1" dur="indefinite" restart="never" nodeType="tmRoot"/>
       </p:par>
     </p:tnLst>
   </p:timing>
@@ -25644,7 +25661,7 @@
   <p:timing>
     <p:tnLst>
       <p:par>
-        <p:cTn id="1" dur="indefinite" restart="never" nodeType="tmRoot"/>
+        <p:cTn xmlns:p14="http://schemas.microsoft.com/office/powerpoint/2010/main" id="1" dur="indefinite" restart="never" nodeType="tmRoot"/>
       </p:par>
     </p:tnLst>
   </p:timing>
@@ -25724,14 +25741,14 @@
             <a:noFill/>
           </a:ln>
           <a:extLst>
-            <a:ext uri="{909E8E84-426E-40DD-AFC4-6F175D3DCCD1}">
+            <a:ext uri="{909E8E84-426E-40dd-AFC4-6F175D3DCCD1}">
               <a14:hiddenFill xmlns:a14="http://schemas.microsoft.com/office/drawing/2010/main">
                 <a:solidFill>
                   <a:srgbClr val="FFFFFF"/>
                 </a:solidFill>
               </a14:hiddenFill>
             </a:ext>
-            <a:ext uri="{91240B29-F687-4F45-9708-019B960494DF}">
+            <a:ext uri="{91240B29-F687-4f45-9708-019B960494DF}">
               <a14:hiddenLine xmlns:a14="http://schemas.microsoft.com/office/drawing/2010/main" w="9525">
                 <a:solidFill>
                   <a:srgbClr val="000000"/>
@@ -25765,14 +25782,14 @@
             <a:noFill/>
           </a:ln>
           <a:extLst>
-            <a:ext uri="{909E8E84-426E-40DD-AFC4-6F175D3DCCD1}">
+            <a:ext uri="{909E8E84-426E-40dd-AFC4-6F175D3DCCD1}">
               <a14:hiddenFill xmlns:a14="http://schemas.microsoft.com/office/drawing/2010/main">
                 <a:solidFill>
                   <a:srgbClr val="FFFFFF"/>
                 </a:solidFill>
               </a14:hiddenFill>
             </a:ext>
-            <a:ext uri="{91240B29-F687-4F45-9708-019B960494DF}">
+            <a:ext uri="{91240B29-F687-4f45-9708-019B960494DF}">
               <a14:hiddenLine xmlns:a14="http://schemas.microsoft.com/office/drawing/2010/main" w="9525">
                 <a:solidFill>
                   <a:srgbClr val="000000"/>
@@ -25934,7 +25951,7 @@
   <p:timing>
     <p:tnLst>
       <p:par>
-        <p:cTn id="1" dur="indefinite" restart="never" nodeType="tmRoot"/>
+        <p:cTn xmlns:p14="http://schemas.microsoft.com/office/powerpoint/2010/main" id="1" dur="indefinite" restart="never" nodeType="tmRoot"/>
       </p:par>
     </p:tnLst>
   </p:timing>
@@ -26014,14 +26031,14 @@
             <a:noFill/>
           </a:ln>
           <a:extLst>
-            <a:ext uri="{909E8E84-426E-40DD-AFC4-6F175D3DCCD1}">
+            <a:ext uri="{909E8E84-426E-40dd-AFC4-6F175D3DCCD1}">
               <a14:hiddenFill xmlns:a14="http://schemas.microsoft.com/office/drawing/2010/main">
                 <a:solidFill>
                   <a:srgbClr val="FFFFFF"/>
                 </a:solidFill>
               </a14:hiddenFill>
             </a:ext>
-            <a:ext uri="{91240B29-F687-4F45-9708-019B960494DF}">
+            <a:ext uri="{91240B29-F687-4f45-9708-019B960494DF}">
               <a14:hiddenLine xmlns:a14="http://schemas.microsoft.com/office/drawing/2010/main" w="9525">
                 <a:solidFill>
                   <a:srgbClr val="000000"/>
@@ -26055,14 +26072,14 @@
             <a:noFill/>
           </a:ln>
           <a:extLst>
-            <a:ext uri="{909E8E84-426E-40DD-AFC4-6F175D3DCCD1}">
+            <a:ext uri="{909E8E84-426E-40dd-AFC4-6F175D3DCCD1}">
               <a14:hiddenFill xmlns:a14="http://schemas.microsoft.com/office/drawing/2010/main">
                 <a:solidFill>
                   <a:srgbClr val="FFFFFF"/>
                 </a:solidFill>
               </a14:hiddenFill>
             </a:ext>
-            <a:ext uri="{91240B29-F687-4F45-9708-019B960494DF}">
+            <a:ext uri="{91240B29-F687-4f45-9708-019B960494DF}">
               <a14:hiddenLine xmlns:a14="http://schemas.microsoft.com/office/drawing/2010/main" w="9525">
                 <a:solidFill>
                   <a:srgbClr val="000000"/>
@@ -26249,7 +26266,7 @@
             <a:tailEnd/>
           </a:ln>
           <a:extLst>
-            <a:ext uri="{909E8E84-426E-40DD-AFC4-6F175D3DCCD1}">
+            <a:ext uri="{909E8E84-426E-40dd-AFC4-6F175D3DCCD1}">
               <a14:hiddenFill xmlns:a14="http://schemas.microsoft.com/office/drawing/2010/main">
                 <a:solidFill>
                   <a:srgbClr val="FFFFFF"/>
@@ -26398,7 +26415,7 @@
             <a:tailEnd type="triangle" w="med" len="med"/>
           </a:ln>
           <a:extLst>
-            <a:ext uri="{909E8E84-426E-40DD-AFC4-6F175D3DCCD1}">
+            <a:ext uri="{909E8E84-426E-40dd-AFC4-6F175D3DCCD1}">
               <a14:hiddenFill xmlns:a14="http://schemas.microsoft.com/office/drawing/2010/main">
                 <a:noFill/>
               </a14:hiddenFill>
@@ -26421,7 +26438,7 @@
   <p:timing>
     <p:tnLst>
       <p:par>
-        <p:cTn id="1" dur="indefinite" restart="never" nodeType="tmRoot"/>
+        <p:cTn xmlns:p14="http://schemas.microsoft.com/office/powerpoint/2010/main" id="1" dur="indefinite" restart="never" nodeType="tmRoot"/>
       </p:par>
     </p:tnLst>
   </p:timing>
@@ -26501,14 +26518,14 @@
             <a:noFill/>
           </a:ln>
           <a:extLst>
-            <a:ext uri="{909E8E84-426E-40DD-AFC4-6F175D3DCCD1}">
+            <a:ext uri="{909E8E84-426E-40dd-AFC4-6F175D3DCCD1}">
               <a14:hiddenFill xmlns:a14="http://schemas.microsoft.com/office/drawing/2010/main">
                 <a:solidFill>
                   <a:srgbClr val="FFFFFF"/>
                 </a:solidFill>
               </a14:hiddenFill>
             </a:ext>
-            <a:ext uri="{91240B29-F687-4F45-9708-019B960494DF}">
+            <a:ext uri="{91240B29-F687-4f45-9708-019B960494DF}">
               <a14:hiddenLine xmlns:a14="http://schemas.microsoft.com/office/drawing/2010/main" w="9525">
                 <a:solidFill>
                   <a:srgbClr val="000000"/>
@@ -26542,14 +26559,14 @@
             <a:noFill/>
           </a:ln>
           <a:extLst>
-            <a:ext uri="{909E8E84-426E-40DD-AFC4-6F175D3DCCD1}">
+            <a:ext uri="{909E8E84-426E-40dd-AFC4-6F175D3DCCD1}">
               <a14:hiddenFill xmlns:a14="http://schemas.microsoft.com/office/drawing/2010/main">
                 <a:solidFill>
                   <a:srgbClr val="FFFFFF"/>
                 </a:solidFill>
               </a14:hiddenFill>
             </a:ext>
-            <a:ext uri="{91240B29-F687-4F45-9708-019B960494DF}">
+            <a:ext uri="{91240B29-F687-4f45-9708-019B960494DF}">
               <a14:hiddenLine xmlns:a14="http://schemas.microsoft.com/office/drawing/2010/main" w="9525">
                 <a:solidFill>
                   <a:srgbClr val="000000"/>
@@ -26736,7 +26753,7 @@
             <a:tailEnd/>
           </a:ln>
           <a:extLst>
-            <a:ext uri="{909E8E84-426E-40DD-AFC4-6F175D3DCCD1}">
+            <a:ext uri="{909E8E84-426E-40dd-AFC4-6F175D3DCCD1}">
               <a14:hiddenFill xmlns:a14="http://schemas.microsoft.com/office/drawing/2010/main">
                 <a:solidFill>
                   <a:srgbClr val="FFFFFF"/>
@@ -26885,7 +26902,7 @@
             <a:tailEnd type="triangle" w="med" len="med"/>
           </a:ln>
           <a:extLst>
-            <a:ext uri="{909E8E84-426E-40DD-AFC4-6F175D3DCCD1}">
+            <a:ext uri="{909E8E84-426E-40dd-AFC4-6F175D3DCCD1}">
               <a14:hiddenFill xmlns:a14="http://schemas.microsoft.com/office/drawing/2010/main">
                 <a:noFill/>
               </a14:hiddenFill>
@@ -26908,7 +26925,7 @@
   <p:timing>
     <p:tnLst>
       <p:par>
-        <p:cTn id="1" dur="indefinite" restart="never" nodeType="tmRoot"/>
+        <p:cTn xmlns:p14="http://schemas.microsoft.com/office/powerpoint/2010/main" id="1" dur="indefinite" restart="never" nodeType="tmRoot"/>
       </p:par>
     </p:tnLst>
   </p:timing>
@@ -26988,14 +27005,14 @@
             <a:noFill/>
           </a:ln>
           <a:extLst>
-            <a:ext uri="{909E8E84-426E-40DD-AFC4-6F175D3DCCD1}">
+            <a:ext uri="{909E8E84-426E-40dd-AFC4-6F175D3DCCD1}">
               <a14:hiddenFill xmlns:a14="http://schemas.microsoft.com/office/drawing/2010/main">
                 <a:solidFill>
                   <a:srgbClr val="FFFFFF"/>
                 </a:solidFill>
               </a14:hiddenFill>
             </a:ext>
-            <a:ext uri="{91240B29-F687-4F45-9708-019B960494DF}">
+            <a:ext uri="{91240B29-F687-4f45-9708-019B960494DF}">
               <a14:hiddenLine xmlns:a14="http://schemas.microsoft.com/office/drawing/2010/main" w="9525">
                 <a:solidFill>
                   <a:srgbClr val="000000"/>
@@ -27029,14 +27046,14 @@
             <a:noFill/>
           </a:ln>
           <a:extLst>
-            <a:ext uri="{909E8E84-426E-40DD-AFC4-6F175D3DCCD1}">
+            <a:ext uri="{909E8E84-426E-40dd-AFC4-6F175D3DCCD1}">
               <a14:hiddenFill xmlns:a14="http://schemas.microsoft.com/office/drawing/2010/main">
                 <a:solidFill>
                   <a:srgbClr val="FFFFFF"/>
                 </a:solidFill>
               </a14:hiddenFill>
             </a:ext>
-            <a:ext uri="{91240B29-F687-4F45-9708-019B960494DF}">
+            <a:ext uri="{91240B29-F687-4f45-9708-019B960494DF}">
               <a14:hiddenLine xmlns:a14="http://schemas.microsoft.com/office/drawing/2010/main" w="9525">
                 <a:solidFill>
                   <a:srgbClr val="000000"/>
@@ -27223,7 +27240,7 @@
             <a:tailEnd/>
           </a:ln>
           <a:extLst>
-            <a:ext uri="{909E8E84-426E-40DD-AFC4-6F175D3DCCD1}">
+            <a:ext uri="{909E8E84-426E-40dd-AFC4-6F175D3DCCD1}">
               <a14:hiddenFill xmlns:a14="http://schemas.microsoft.com/office/drawing/2010/main">
                 <a:solidFill>
                   <a:srgbClr val="FFFFFF"/>
@@ -27372,7 +27389,7 @@
             <a:tailEnd type="triangle" w="med" len="med"/>
           </a:ln>
           <a:extLst>
-            <a:ext uri="{909E8E84-426E-40DD-AFC4-6F175D3DCCD1}">
+            <a:ext uri="{909E8E84-426E-40dd-AFC4-6F175D3DCCD1}">
               <a14:hiddenFill xmlns:a14="http://schemas.microsoft.com/office/drawing/2010/main">
                 <a:noFill/>
               </a14:hiddenFill>
@@ -27395,7 +27412,7 @@
   <p:timing>
     <p:tnLst>
       <p:par>
-        <p:cTn id="1" dur="indefinite" restart="never" nodeType="tmRoot"/>
+        <p:cTn xmlns:p14="http://schemas.microsoft.com/office/powerpoint/2010/main" id="1" dur="indefinite" restart="never" nodeType="tmRoot"/>
       </p:par>
     </p:tnLst>
   </p:timing>
@@ -27475,14 +27492,14 @@
             <a:noFill/>
           </a:ln>
           <a:extLst>
-            <a:ext uri="{909E8E84-426E-40DD-AFC4-6F175D3DCCD1}">
+            <a:ext uri="{909E8E84-426E-40dd-AFC4-6F175D3DCCD1}">
               <a14:hiddenFill xmlns:a14="http://schemas.microsoft.com/office/drawing/2010/main">
                 <a:solidFill>
                   <a:srgbClr val="FFFFFF"/>
                 </a:solidFill>
               </a14:hiddenFill>
             </a:ext>
-            <a:ext uri="{91240B29-F687-4F45-9708-019B960494DF}">
+            <a:ext uri="{91240B29-F687-4f45-9708-019B960494DF}">
               <a14:hiddenLine xmlns:a14="http://schemas.microsoft.com/office/drawing/2010/main" w="9525">
                 <a:solidFill>
                   <a:srgbClr val="000000"/>
@@ -27516,14 +27533,14 @@
             <a:noFill/>
           </a:ln>
           <a:extLst>
-            <a:ext uri="{909E8E84-426E-40DD-AFC4-6F175D3DCCD1}">
+            <a:ext uri="{909E8E84-426E-40dd-AFC4-6F175D3DCCD1}">
               <a14:hiddenFill xmlns:a14="http://schemas.microsoft.com/office/drawing/2010/main">
                 <a:solidFill>
                   <a:srgbClr val="FFFFFF"/>
                 </a:solidFill>
               </a14:hiddenFill>
             </a:ext>
-            <a:ext uri="{91240B29-F687-4F45-9708-019B960494DF}">
+            <a:ext uri="{91240B29-F687-4f45-9708-019B960494DF}">
               <a14:hiddenLine xmlns:a14="http://schemas.microsoft.com/office/drawing/2010/main" w="9525">
                 <a:solidFill>
                   <a:srgbClr val="000000"/>
@@ -27672,7 +27689,7 @@
             <a:tailEnd/>
           </a:ln>
           <a:extLst>
-            <a:ext uri="{909E8E84-426E-40DD-AFC4-6F175D3DCCD1}">
+            <a:ext uri="{909E8E84-426E-40dd-AFC4-6F175D3DCCD1}">
               <a14:hiddenFill xmlns:a14="http://schemas.microsoft.com/office/drawing/2010/main">
                 <a:solidFill>
                   <a:srgbClr val="FFFFFF"/>
@@ -27803,7 +27820,7 @@
   <p:timing>
     <p:tnLst>
       <p:par>
-        <p:cTn id="1" dur="indefinite" restart="never" nodeType="tmRoot"/>
+        <p:cTn xmlns:p14="http://schemas.microsoft.com/office/powerpoint/2010/main" id="1" dur="indefinite" restart="never" nodeType="tmRoot"/>
       </p:par>
     </p:tnLst>
   </p:timing>
@@ -27907,7 +27924,7 @@
   <p:timing>
     <p:tnLst>
       <p:par>
-        <p:cTn id="1" dur="indefinite" restart="never" nodeType="tmRoot"/>
+        <p:cTn xmlns:p14="http://schemas.microsoft.com/office/powerpoint/2010/main" id="1" dur="indefinite" restart="never" nodeType="tmRoot"/>
       </p:par>
     </p:tnLst>
   </p:timing>
@@ -27965,14 +27982,14 @@
             <a:noFill/>
           </a:ln>
           <a:extLst>
-            <a:ext uri="{909E8E84-426E-40DD-AFC4-6F175D3DCCD1}">
+            <a:ext uri="{909E8E84-426E-40dd-AFC4-6F175D3DCCD1}">
               <a14:hiddenFill xmlns:a14="http://schemas.microsoft.com/office/drawing/2010/main">
                 <a:solidFill>
                   <a:srgbClr val="FFFFFF"/>
                 </a:solidFill>
               </a14:hiddenFill>
             </a:ext>
-            <a:ext uri="{91240B29-F687-4F45-9708-019B960494DF}">
+            <a:ext uri="{91240B29-F687-4f45-9708-019B960494DF}">
               <a14:hiddenLine xmlns:a14="http://schemas.microsoft.com/office/drawing/2010/main" w="9525">
                 <a:solidFill>
                   <a:srgbClr val="000000"/>
@@ -28028,14 +28045,14 @@
             <a:noFill/>
           </a:ln>
           <a:extLst>
-            <a:ext uri="{909E8E84-426E-40DD-AFC4-6F175D3DCCD1}">
+            <a:ext uri="{909E8E84-426E-40dd-AFC4-6F175D3DCCD1}">
               <a14:hiddenFill xmlns:a14="http://schemas.microsoft.com/office/drawing/2010/main">
                 <a:solidFill>
                   <a:srgbClr val="FFFFFF"/>
                 </a:solidFill>
               </a14:hiddenFill>
             </a:ext>
-            <a:ext uri="{91240B29-F687-4F45-9708-019B960494DF}">
+            <a:ext uri="{91240B29-F687-4f45-9708-019B960494DF}">
               <a14:hiddenLine xmlns:a14="http://schemas.microsoft.com/office/drawing/2010/main" w="9525">
                 <a:solidFill>
                   <a:srgbClr val="000000"/>
@@ -28222,7 +28239,7 @@
             <a:tailEnd/>
           </a:ln>
           <a:extLst>
-            <a:ext uri="{909E8E84-426E-40DD-AFC4-6F175D3DCCD1}">
+            <a:ext uri="{909E8E84-426E-40dd-AFC4-6F175D3DCCD1}">
               <a14:hiddenFill xmlns:a14="http://schemas.microsoft.com/office/drawing/2010/main">
                 <a:solidFill>
                   <a:srgbClr val="FFFFFF"/>
@@ -28371,7 +28388,7 @@
             <a:tailEnd type="triangle" w="med" len="med"/>
           </a:ln>
           <a:extLst>
-            <a:ext uri="{909E8E84-426E-40DD-AFC4-6F175D3DCCD1}">
+            <a:ext uri="{909E8E84-426E-40dd-AFC4-6F175D3DCCD1}">
               <a14:hiddenFill xmlns:a14="http://schemas.microsoft.com/office/drawing/2010/main">
                 <a:noFill/>
               </a14:hiddenFill>
@@ -28394,7 +28411,7 @@
   <p:timing>
     <p:tnLst>
       <p:par>
-        <p:cTn id="1" dur="indefinite" restart="never" nodeType="tmRoot"/>
+        <p:cTn xmlns:p14="http://schemas.microsoft.com/office/powerpoint/2010/main" id="1" dur="indefinite" restart="never" nodeType="tmRoot"/>
       </p:par>
     </p:tnLst>
   </p:timing>
@@ -28458,14 +28475,14 @@
           <a:noFill/>
           <a:ln/>
           <a:extLst>
-            <a:ext uri="{909E8E84-426E-40DD-AFC4-6F175D3DCCD1}">
+            <a:ext uri="{909E8E84-426E-40dd-AFC4-6F175D3DCCD1}">
               <a14:hiddenFill xmlns:a14="http://schemas.microsoft.com/office/drawing/2010/main">
                 <a:solidFill>
                   <a:srgbClr val="FFFFFF"/>
                 </a:solidFill>
               </a14:hiddenFill>
             </a:ext>
-            <a:ext uri="{91240B29-F687-4F45-9708-019B960494DF}">
+            <a:ext uri="{91240B29-F687-4f45-9708-019B960494DF}">
               <a14:hiddenLine xmlns:a14="http://schemas.microsoft.com/office/drawing/2010/main" w="9525">
                 <a:solidFill>
                   <a:srgbClr val="000000"/>
@@ -28912,7 +28929,7 @@
               <a:t>Compute to off-chip memory access ratio close to 1:1 (not very high)</a:t>
             </a:r>
             <a:r>
-              <a:rPr lang="ar-SA" kern="0" dirty="0">
+              <a:rPr lang="x-none" kern="0" dirty="0">
                 <a:latin typeface="+mn-lt"/>
                 <a:cs typeface="Arial" charset="0"/>
               </a:rPr>
@@ -29476,14 +29493,14 @@
             <a:noFill/>
           </a:ln>
           <a:extLst>
-            <a:ext uri="{909E8E84-426E-40DD-AFC4-6F175D3DCCD1}">
+            <a:ext uri="{909E8E84-426E-40dd-AFC4-6F175D3DCCD1}">
               <a14:hiddenFill xmlns:a14="http://schemas.microsoft.com/office/drawing/2010/main">
                 <a:solidFill>
                   <a:srgbClr val="FFFFFF"/>
                 </a:solidFill>
               </a14:hiddenFill>
             </a:ext>
-            <a:ext uri="{91240B29-F687-4F45-9708-019B960494DF}">
+            <a:ext uri="{91240B29-F687-4f45-9708-019B960494DF}">
               <a14:hiddenLine xmlns:a14="http://schemas.microsoft.com/office/drawing/2010/main" w="9525">
                 <a:solidFill>
                   <a:srgbClr val="000000"/>
@@ -29530,14 +29547,14 @@
             <a:noFill/>
           </a:ln>
           <a:extLst>
-            <a:ext uri="{909E8E84-426E-40DD-AFC4-6F175D3DCCD1}">
+            <a:ext uri="{909E8E84-426E-40dd-AFC4-6F175D3DCCD1}">
               <a14:hiddenFill xmlns:a14="http://schemas.microsoft.com/office/drawing/2010/main">
                 <a:solidFill>
                   <a:srgbClr val="FFFFFF"/>
                 </a:solidFill>
               </a14:hiddenFill>
             </a:ext>
-            <a:ext uri="{91240B29-F687-4F45-9708-019B960494DF}">
+            <a:ext uri="{91240B29-F687-4f45-9708-019B960494DF}">
               <a14:hiddenLine xmlns:a14="http://schemas.microsoft.com/office/drawing/2010/main" w="9525">
                 <a:solidFill>
                   <a:srgbClr val="000000"/>
@@ -29584,14 +29601,14 @@
             <a:noFill/>
           </a:ln>
           <a:extLst>
-            <a:ext uri="{909E8E84-426E-40DD-AFC4-6F175D3DCCD1}">
+            <a:ext uri="{909E8E84-426E-40dd-AFC4-6F175D3DCCD1}">
               <a14:hiddenFill xmlns:a14="http://schemas.microsoft.com/office/drawing/2010/main">
                 <a:solidFill>
                   <a:srgbClr val="FFFFFF"/>
                 </a:solidFill>
               </a14:hiddenFill>
             </a:ext>
-            <a:ext uri="{91240B29-F687-4F45-9708-019B960494DF}">
+            <a:ext uri="{91240B29-F687-4f45-9708-019B960494DF}">
               <a14:hiddenLine xmlns:a14="http://schemas.microsoft.com/office/drawing/2010/main" w="9525">
                 <a:solidFill>
                   <a:srgbClr val="000000"/>
@@ -29638,14 +29655,14 @@
             <a:noFill/>
           </a:ln>
           <a:extLst>
-            <a:ext uri="{909E8E84-426E-40DD-AFC4-6F175D3DCCD1}">
+            <a:ext uri="{909E8E84-426E-40dd-AFC4-6F175D3DCCD1}">
               <a14:hiddenFill xmlns:a14="http://schemas.microsoft.com/office/drawing/2010/main">
                 <a:solidFill>
                   <a:srgbClr val="FFFFFF"/>
                 </a:solidFill>
               </a14:hiddenFill>
             </a:ext>
-            <a:ext uri="{91240B29-F687-4F45-9708-019B960494DF}">
+            <a:ext uri="{91240B29-F687-4f45-9708-019B960494DF}">
               <a14:hiddenLine xmlns:a14="http://schemas.microsoft.com/office/drawing/2010/main" w="9525">
                 <a:solidFill>
                   <a:srgbClr val="000000"/>
@@ -29920,14 +29937,14 @@
             <a:noFill/>
           </a:ln>
           <a:extLst>
-            <a:ext uri="{909E8E84-426E-40DD-AFC4-6F175D3DCCD1}">
+            <a:ext uri="{909E8E84-426E-40dd-AFC4-6F175D3DCCD1}">
               <a14:hiddenFill xmlns:a14="http://schemas.microsoft.com/office/drawing/2010/main">
                 <a:solidFill>
                   <a:srgbClr val="FFFFFF"/>
                 </a:solidFill>
               </a14:hiddenFill>
             </a:ext>
-            <a:ext uri="{91240B29-F687-4F45-9708-019B960494DF}">
+            <a:ext uri="{91240B29-F687-4f45-9708-019B960494DF}">
               <a14:hiddenLine xmlns:a14="http://schemas.microsoft.com/office/drawing/2010/main" w="9525">
                 <a:solidFill>
                   <a:srgbClr val="000000"/>
@@ -30088,14 +30105,14 @@
             <a:noFill/>
           </a:ln>
           <a:extLst>
-            <a:ext uri="{909E8E84-426E-40DD-AFC4-6F175D3DCCD1}">
+            <a:ext uri="{909E8E84-426E-40dd-AFC4-6F175D3DCCD1}">
               <a14:hiddenFill xmlns:a14="http://schemas.microsoft.com/office/drawing/2010/main">
                 <a:solidFill>
                   <a:srgbClr val="FFFFFF"/>
                 </a:solidFill>
               </a14:hiddenFill>
             </a:ext>
-            <a:ext uri="{91240B29-F687-4F45-9708-019B960494DF}">
+            <a:ext uri="{91240B29-F687-4f45-9708-019B960494DF}">
               <a14:hiddenLine xmlns:a14="http://schemas.microsoft.com/office/drawing/2010/main" w="9525">
                 <a:solidFill>
                   <a:srgbClr val="000000"/>
@@ -30256,14 +30273,14 @@
             <a:noFill/>
           </a:ln>
           <a:extLst>
-            <a:ext uri="{909E8E84-426E-40DD-AFC4-6F175D3DCCD1}">
+            <a:ext uri="{909E8E84-426E-40dd-AFC4-6F175D3DCCD1}">
               <a14:hiddenFill xmlns:a14="http://schemas.microsoft.com/office/drawing/2010/main">
                 <a:solidFill>
                   <a:srgbClr val="FFFFFF"/>
                 </a:solidFill>
               </a14:hiddenFill>
             </a:ext>
-            <a:ext uri="{91240B29-F687-4F45-9708-019B960494DF}">
+            <a:ext uri="{91240B29-F687-4f45-9708-019B960494DF}">
               <a14:hiddenLine xmlns:a14="http://schemas.microsoft.com/office/drawing/2010/main" w="9525">
                 <a:solidFill>
                   <a:srgbClr val="000000"/>
@@ -30424,14 +30441,14 @@
             <a:noFill/>
           </a:ln>
           <a:extLst>
-            <a:ext uri="{909E8E84-426E-40DD-AFC4-6F175D3DCCD1}">
+            <a:ext uri="{909E8E84-426E-40dd-AFC4-6F175D3DCCD1}">
               <a14:hiddenFill xmlns:a14="http://schemas.microsoft.com/office/drawing/2010/main">
                 <a:solidFill>
                   <a:srgbClr val="FFFFFF"/>
                 </a:solidFill>
               </a14:hiddenFill>
             </a:ext>
-            <a:ext uri="{91240B29-F687-4F45-9708-019B960494DF}">
+            <a:ext uri="{91240B29-F687-4f45-9708-019B960494DF}">
               <a14:hiddenLine xmlns:a14="http://schemas.microsoft.com/office/drawing/2010/main" w="9525">
                 <a:solidFill>
                   <a:srgbClr val="000000"/>
@@ -31599,7 +31616,7 @@
               <a:t>(2, 2)</a:t>
             </a:r>
             <a:r>
-              <a:rPr lang="ar-SA" sz="600" b="1">
+              <a:rPr lang="x-none" sz="600" b="1">
                 <a:solidFill>
                   <a:srgbClr val="000000"/>
                 </a:solidFill>
@@ -31834,7 +31851,7 @@
             <a:tailEnd/>
           </a:ln>
           <a:extLst>
-            <a:ext uri="{909E8E84-426E-40DD-AFC4-6F175D3DCCD1}">
+            <a:ext uri="{909E8E84-426E-40dd-AFC4-6F175D3DCCD1}">
               <a14:hiddenFill xmlns:a14="http://schemas.microsoft.com/office/drawing/2010/main">
                 <a:noFill/>
               </a14:hiddenFill>
@@ -31876,7 +31893,7 @@
             <a:tailEnd/>
           </a:ln>
           <a:extLst>
-            <a:ext uri="{909E8E84-426E-40DD-AFC4-6F175D3DCCD1}">
+            <a:ext uri="{909E8E84-426E-40dd-AFC4-6F175D3DCCD1}">
               <a14:hiddenFill xmlns:a14="http://schemas.microsoft.com/office/drawing/2010/main">
                 <a:noFill/>
               </a14:hiddenFill>
@@ -31917,7 +31934,7 @@
             <a:tailEnd type="triangle" w="med" len="med"/>
           </a:ln>
           <a:extLst>
-            <a:ext uri="{909E8E84-426E-40DD-AFC4-6F175D3DCCD1}">
+            <a:ext uri="{909E8E84-426E-40dd-AFC4-6F175D3DCCD1}">
               <a14:hiddenFill xmlns:a14="http://schemas.microsoft.com/office/drawing/2010/main">
                 <a:noFill/>
               </a14:hiddenFill>
@@ -31953,14 +31970,14 @@
             <a:noFill/>
           </a:ln>
           <a:extLst>
-            <a:ext uri="{909E8E84-426E-40DD-AFC4-6F175D3DCCD1}">
+            <a:ext uri="{909E8E84-426E-40dd-AFC4-6F175D3DCCD1}">
               <a14:hiddenFill xmlns:a14="http://schemas.microsoft.com/office/drawing/2010/main">
                 <a:solidFill>
                   <a:srgbClr val="FFFFFF"/>
                 </a:solidFill>
               </a14:hiddenFill>
             </a:ext>
-            <a:ext uri="{91240B29-F687-4F45-9708-019B960494DF}">
+            <a:ext uri="{91240B29-F687-4f45-9708-019B960494DF}">
               <a14:hiddenLine xmlns:a14="http://schemas.microsoft.com/office/drawing/2010/main" w="9525">
                 <a:solidFill>
                   <a:srgbClr val="000000"/>
@@ -32242,14 +32259,14 @@
             <a:noFill/>
           </a:ln>
           <a:extLst>
-            <a:ext uri="{909E8E84-426E-40DD-AFC4-6F175D3DCCD1}">
+            <a:ext uri="{909E8E84-426E-40dd-AFC4-6F175D3DCCD1}">
               <a14:hiddenFill xmlns:a14="http://schemas.microsoft.com/office/drawing/2010/main">
                 <a:solidFill>
                   <a:srgbClr val="FFFFFF"/>
                 </a:solidFill>
               </a14:hiddenFill>
             </a:ext>
-            <a:ext uri="{91240B29-F687-4F45-9708-019B960494DF}">
+            <a:ext uri="{91240B29-F687-4f45-9708-019B960494DF}">
               <a14:hiddenLine xmlns:a14="http://schemas.microsoft.com/office/drawing/2010/main" w="9525">
                 <a:solidFill>
                   <a:srgbClr val="000000"/>
@@ -32531,14 +32548,14 @@
             <a:noFill/>
           </a:ln>
           <a:extLst>
-            <a:ext uri="{909E8E84-426E-40DD-AFC4-6F175D3DCCD1}">
+            <a:ext uri="{909E8E84-426E-40dd-AFC4-6F175D3DCCD1}">
               <a14:hiddenFill xmlns:a14="http://schemas.microsoft.com/office/drawing/2010/main">
                 <a:solidFill>
                   <a:srgbClr val="FFFFFF"/>
                 </a:solidFill>
               </a14:hiddenFill>
             </a:ext>
-            <a:ext uri="{91240B29-F687-4F45-9708-019B960494DF}">
+            <a:ext uri="{91240B29-F687-4f45-9708-019B960494DF}">
               <a14:hiddenLine xmlns:a14="http://schemas.microsoft.com/office/drawing/2010/main" w="9525">
                 <a:solidFill>
                   <a:srgbClr val="000000"/>
@@ -32820,14 +32837,14 @@
             <a:noFill/>
           </a:ln>
           <a:extLst>
-            <a:ext uri="{909E8E84-426E-40DD-AFC4-6F175D3DCCD1}">
+            <a:ext uri="{909E8E84-426E-40dd-AFC4-6F175D3DCCD1}">
               <a14:hiddenFill xmlns:a14="http://schemas.microsoft.com/office/drawing/2010/main">
                 <a:solidFill>
                   <a:srgbClr val="FFFFFF"/>
                 </a:solidFill>
               </a14:hiddenFill>
             </a:ext>
-            <a:ext uri="{91240B29-F687-4F45-9708-019B960494DF}">
+            <a:ext uri="{91240B29-F687-4f45-9708-019B960494DF}">
               <a14:hiddenLine xmlns:a14="http://schemas.microsoft.com/office/drawing/2010/main" w="9525">
                 <a:solidFill>
                   <a:srgbClr val="000000"/>
@@ -33106,14 +33123,14 @@
           <a:noFill/>
           <a:ln/>
           <a:extLst>
-            <a:ext uri="{909E8E84-426E-40DD-AFC4-6F175D3DCCD1}">
+            <a:ext uri="{909E8E84-426E-40dd-AFC4-6F175D3DCCD1}">
               <a14:hiddenFill xmlns:a14="http://schemas.microsoft.com/office/drawing/2010/main">
                 <a:solidFill>
                   <a:srgbClr val="FFFFFF"/>
                 </a:solidFill>
               </a14:hiddenFill>
             </a:ext>
-            <a:ext uri="{91240B29-F687-4F45-9708-019B960494DF}">
+            <a:ext uri="{91240B29-F687-4f45-9708-019B960494DF}">
               <a14:hiddenLine xmlns:a14="http://schemas.microsoft.com/office/drawing/2010/main" w="9525">
                 <a:solidFill>
                   <a:srgbClr val="000000"/>
@@ -33260,14 +33277,14 @@
             <a:noFill/>
           </a:ln>
           <a:extLst>
-            <a:ext uri="{909E8E84-426E-40DD-AFC4-6F175D3DCCD1}">
+            <a:ext uri="{909E8E84-426E-40dd-AFC4-6F175D3DCCD1}">
               <a14:hiddenFill xmlns:a14="http://schemas.microsoft.com/office/drawing/2010/main">
                 <a:solidFill>
                   <a:srgbClr val="FFFFFF"/>
                 </a:solidFill>
               </a14:hiddenFill>
             </a:ext>
-            <a:ext uri="{91240B29-F687-4F45-9708-019B960494DF}">
+            <a:ext uri="{91240B29-F687-4f45-9708-019B960494DF}">
               <a14:hiddenLine xmlns:a14="http://schemas.microsoft.com/office/drawing/2010/main" w="9525">
                 <a:solidFill>
                   <a:srgbClr val="000000"/>
@@ -33398,7 +33415,7 @@
   <p:timing>
     <p:tnLst>
       <p:par>
-        <p:cTn id="1" dur="indefinite" restart="never" nodeType="tmRoot"/>
+        <p:cTn xmlns:p14="http://schemas.microsoft.com/office/powerpoint/2010/main" id="1" dur="indefinite" restart="never" nodeType="tmRoot"/>
       </p:par>
     </p:tnLst>
   </p:timing>
@@ -33480,7 +33497,7 @@
   <p:timing>
     <p:tnLst>
       <p:par>
-        <p:cTn id="1" dur="indefinite" restart="never" nodeType="tmRoot"/>
+        <p:cTn xmlns:p14="http://schemas.microsoft.com/office/powerpoint/2010/main" id="1" dur="indefinite" restart="never" nodeType="tmRoot"/>
       </p:par>
     </p:tnLst>
   </p:timing>
@@ -33557,7 +33574,7 @@
   <p:timing>
     <p:tnLst>
       <p:par>
-        <p:cTn id="1" dur="indefinite" restart="never" nodeType="tmRoot"/>
+        <p:cTn xmlns:p14="http://schemas.microsoft.com/office/powerpoint/2010/main" id="1" dur="indefinite" restart="never" nodeType="tmRoot"/>
       </p:par>
     </p:tnLst>
   </p:timing>
@@ -33698,11 +33715,7 @@
             </a:r>
             <a:r>
               <a:rPr lang="en-US" sz="2800" dirty="0" smtClean="0"/>
-              <a:t> </a:t>
-            </a:r>
-            <a:r>
-              <a:rPr lang="en-US" sz="2800" dirty="0" smtClean="0"/>
-              <a:t>specification</a:t>
+              <a:t> specification</a:t>
             </a:r>
           </a:p>
           <a:p>
@@ -33738,7 +33751,7 @@
   <p:timing>
     <p:tnLst>
       <p:par>
-        <p:cTn id="1" dur="indefinite" restart="never" nodeType="tmRoot">
+        <p:cTn xmlns:p14="http://schemas.microsoft.com/office/powerpoint/2010/main" id="1" dur="indefinite" restart="never" nodeType="tmRoot">
           <p:childTnLst>
             <p:seq concurrent="1" nextAc="seek">
               <p:cTn id="2" dur="indefinite" nodeType="mainSeq">
@@ -34027,7 +34040,7 @@
   <p:timing>
     <p:tnLst>
       <p:par>
-        <p:cTn id="1" dur="indefinite" restart="never" nodeType="tmRoot"/>
+        <p:cTn xmlns:p14="http://schemas.microsoft.com/office/powerpoint/2010/main" id="1" dur="indefinite" restart="never" nodeType="tmRoot"/>
       </p:par>
     </p:tnLst>
   </p:timing>
@@ -34192,7 +34205,7 @@
   <p:timing>
     <p:tnLst>
       <p:par>
-        <p:cTn id="1" dur="indefinite" restart="never" nodeType="tmRoot"/>
+        <p:cTn xmlns:p14="http://schemas.microsoft.com/office/powerpoint/2010/main" id="1" dur="indefinite" restart="never" nodeType="tmRoot"/>
       </p:par>
     </p:tnLst>
   </p:timing>

</xml_diff>